<commit_message>
updates up until Lecture 4
</commit_message>
<xml_diff>
--- a/pres-source/04-sql.pptx
+++ b/pres-source/04-sql.pptx
@@ -5,7 +5,7 @@
     <p:sldMasterId id="2147483648" r:id="rId1"/>
   </p:sldMasterIdLst>
   <p:notesMasterIdLst>
-    <p:notesMasterId r:id="rId31"/>
+    <p:notesMasterId r:id="rId32"/>
   </p:notesMasterIdLst>
   <p:sldIdLst>
     <p:sldId id="256" r:id="rId2"/>
@@ -28,15 +28,16 @@
     <p:sldId id="277" r:id="rId19"/>
     <p:sldId id="271" r:id="rId20"/>
     <p:sldId id="278" r:id="rId21"/>
-    <p:sldId id="269" r:id="rId22"/>
-    <p:sldId id="284" r:id="rId23"/>
-    <p:sldId id="285" r:id="rId24"/>
-    <p:sldId id="279" r:id="rId25"/>
-    <p:sldId id="280" r:id="rId26"/>
-    <p:sldId id="281" r:id="rId27"/>
-    <p:sldId id="282" r:id="rId28"/>
-    <p:sldId id="283" r:id="rId29"/>
-    <p:sldId id="270" r:id="rId30"/>
+    <p:sldId id="289" r:id="rId22"/>
+    <p:sldId id="269" r:id="rId23"/>
+    <p:sldId id="284" r:id="rId24"/>
+    <p:sldId id="285" r:id="rId25"/>
+    <p:sldId id="279" r:id="rId26"/>
+    <p:sldId id="280" r:id="rId27"/>
+    <p:sldId id="281" r:id="rId28"/>
+    <p:sldId id="282" r:id="rId29"/>
+    <p:sldId id="283" r:id="rId30"/>
+    <p:sldId id="270" r:id="rId31"/>
   </p:sldIdLst>
   <p:sldSz cx="9144000" cy="6858000" type="screen4x3"/>
   <p:notesSz cx="6858000" cy="9144000"/>
@@ -241,7 +242,7 @@
             <a:fld id="{7307762F-A706-E543-A832-3C298AA3103F}" type="datetimeFigureOut">
               <a:rPr lang="en-US" smtClean="0"/>
               <a:pPr/>
-              <a:t>3/1/19</a:t>
+              <a:t>2/25/20</a:t>
             </a:fld>
             <a:endParaRPr lang="en-US" dirty="0"/>
           </a:p>
@@ -741,13 +742,8 @@
           <a:p>
             <a:r>
               <a:rPr lang="en-US" dirty="0"/>
-              <a:t>Can’t use split </a:t>
-            </a:r>
-            <a:r>
-              <a:rPr lang="en-US"/>
-              <a:t>like this</a:t>
-            </a:r>
-            <a:endParaRPr lang="en-US" dirty="0"/>
+              <a:t>Can’t use split like this</a:t>
+            </a:r>
           </a:p>
           <a:p>
             <a:endParaRPr lang="en-US" dirty="0"/>
@@ -772,7 +768,7 @@
             <a:fld id="{BC39F3E1-B436-EB4D-8332-DAA0486A7B2B}" type="slidenum">
               <a:rPr lang="en-US" smtClean="0"/>
               <a:pPr/>
-              <a:t>27</a:t>
+              <a:t>28</a:t>
             </a:fld>
             <a:endParaRPr lang="en-US" dirty="0"/>
           </a:p>
@@ -1081,7 +1077,7 @@
           <a:p>
             <a:fld id="{875CF0EB-321F-0749-B37A-89BBA859503C}" type="datetimeFigureOut">
               <a:rPr lang="en-US" smtClean="0"/>
-              <a:t>3/1/19</a:t>
+              <a:t>2/25/20</a:t>
             </a:fld>
             <a:endParaRPr lang="en-US"/>
           </a:p>
@@ -1283,7 +1279,7 @@
           <a:p>
             <a:fld id="{875CF0EB-321F-0749-B37A-89BBA859503C}" type="datetimeFigureOut">
               <a:rPr lang="en-US" smtClean="0"/>
-              <a:t>3/1/19</a:t>
+              <a:t>2/25/20</a:t>
             </a:fld>
             <a:endParaRPr lang="en-US"/>
           </a:p>
@@ -1475,7 +1471,7 @@
           <a:p>
             <a:fld id="{875CF0EB-321F-0749-B37A-89BBA859503C}" type="datetimeFigureOut">
               <a:rPr lang="en-US" smtClean="0"/>
-              <a:t>3/1/19</a:t>
+              <a:t>2/25/20</a:t>
             </a:fld>
             <a:endParaRPr lang="en-US"/>
           </a:p>
@@ -1744,7 +1740,7 @@
           <a:p>
             <a:fld id="{875CF0EB-321F-0749-B37A-89BBA859503C}" type="datetimeFigureOut">
               <a:rPr lang="en-US" smtClean="0"/>
-              <a:t>3/1/19</a:t>
+              <a:t>2/25/20</a:t>
             </a:fld>
             <a:endParaRPr lang="en-US"/>
           </a:p>
@@ -2053,7 +2049,7 @@
           <a:p>
             <a:fld id="{875CF0EB-321F-0749-B37A-89BBA859503C}" type="datetimeFigureOut">
               <a:rPr lang="en-US" smtClean="0"/>
-              <a:t>3/1/19</a:t>
+              <a:t>2/25/20</a:t>
             </a:fld>
             <a:endParaRPr lang="en-US"/>
           </a:p>
@@ -2496,7 +2492,7 @@
           <a:p>
             <a:fld id="{875CF0EB-321F-0749-B37A-89BBA859503C}" type="datetimeFigureOut">
               <a:rPr lang="en-US" smtClean="0"/>
-              <a:t>3/1/19</a:t>
+              <a:t>2/25/20</a:t>
             </a:fld>
             <a:endParaRPr lang="en-US"/>
           </a:p>
@@ -2637,7 +2633,7 @@
           <a:p>
             <a:fld id="{875CF0EB-321F-0749-B37A-89BBA859503C}" type="datetimeFigureOut">
               <a:rPr lang="en-US" smtClean="0"/>
-              <a:t>3/1/19</a:t>
+              <a:t>2/25/20</a:t>
             </a:fld>
             <a:endParaRPr lang="en-US"/>
           </a:p>
@@ -2756,7 +2752,7 @@
           <a:p>
             <a:fld id="{875CF0EB-321F-0749-B37A-89BBA859503C}" type="datetimeFigureOut">
               <a:rPr lang="en-US" smtClean="0"/>
-              <a:t>3/1/19</a:t>
+              <a:t>2/25/20</a:t>
             </a:fld>
             <a:endParaRPr lang="en-US"/>
           </a:p>
@@ -3055,7 +3051,7 @@
           <a:p>
             <a:fld id="{875CF0EB-321F-0749-B37A-89BBA859503C}" type="datetimeFigureOut">
               <a:rPr lang="en-US" smtClean="0"/>
-              <a:t>3/1/19</a:t>
+              <a:t>2/25/20</a:t>
             </a:fld>
             <a:endParaRPr lang="en-US"/>
           </a:p>
@@ -3331,7 +3327,7 @@
           <a:p>
             <a:fld id="{875CF0EB-321F-0749-B37A-89BBA859503C}" type="datetimeFigureOut">
               <a:rPr lang="en-US" smtClean="0"/>
-              <a:t>3/1/19</a:t>
+              <a:t>2/25/20</a:t>
             </a:fld>
             <a:endParaRPr lang="en-US"/>
           </a:p>
@@ -3545,14 +3541,14 @@
           </a:ln>
           <a:extLst>
             <a:ext uri="{909E8E84-426E-40dd-AFC4-6F175D3DCCD1}">
-              <a14:hiddenFill xmlns:a14="http://schemas.microsoft.com/office/drawing/2010/main" xmlns="">
+              <a14:hiddenFill xmlns="" xmlns:a14="http://schemas.microsoft.com/office/drawing/2010/main">
                 <a:solidFill>
                   <a:srgbClr val="FFFFFF"/>
                 </a:solidFill>
               </a14:hiddenFill>
             </a:ext>
             <a:ext uri="{91240B29-F687-4f45-9708-019B960494DF}">
-              <a14:hiddenLine xmlns:a14="http://schemas.microsoft.com/office/drawing/2010/main" xmlns="" w="9525">
+              <a14:hiddenLine xmlns="" xmlns:a14="http://schemas.microsoft.com/office/drawing/2010/main" w="9525">
                 <a:solidFill>
                   <a:srgbClr val="000000"/>
                 </a:solidFill>
@@ -4106,14 +4102,14 @@
           <a:noFill/>
           <a:extLst>
             <a:ext uri="{909E8E84-426E-40dd-AFC4-6F175D3DCCD1}">
-              <a14:hiddenFill xmlns:a14="http://schemas.microsoft.com/office/drawing/2010/main" xmlns="">
+              <a14:hiddenFill xmlns="" xmlns:a14="http://schemas.microsoft.com/office/drawing/2010/main">
                 <a:solidFill>
                   <a:srgbClr val="FFFFFF"/>
                 </a:solidFill>
               </a14:hiddenFill>
             </a:ext>
             <a:ext uri="{91240B29-F687-4f45-9708-019B960494DF}">
-              <a14:hiddenLine xmlns:a14="http://schemas.microsoft.com/office/drawing/2010/main" xmlns="" w="9525">
+              <a14:hiddenLine xmlns="" xmlns:a14="http://schemas.microsoft.com/office/drawing/2010/main" w="9525">
                 <a:solidFill>
                   <a:srgbClr val="000000"/>
                 </a:solidFill>
@@ -4162,14 +4158,14 @@
           <a:noFill/>
           <a:extLst>
             <a:ext uri="{909E8E84-426E-40dd-AFC4-6F175D3DCCD1}">
-              <a14:hiddenFill xmlns:a14="http://schemas.microsoft.com/office/drawing/2010/main" xmlns="">
+              <a14:hiddenFill xmlns="" xmlns:a14="http://schemas.microsoft.com/office/drawing/2010/main">
                 <a:solidFill>
                   <a:srgbClr val="FFFFFF"/>
                 </a:solidFill>
               </a14:hiddenFill>
             </a:ext>
             <a:ext uri="{91240B29-F687-4f45-9708-019B960494DF}">
-              <a14:hiddenLine xmlns:a14="http://schemas.microsoft.com/office/drawing/2010/main" xmlns="" w="9525">
+              <a14:hiddenLine xmlns="" xmlns:a14="http://schemas.microsoft.com/office/drawing/2010/main" w="9525">
                 <a:solidFill>
                   <a:srgbClr val="000000"/>
                 </a:solidFill>
@@ -4205,7 +4201,7 @@
                 <a:ea typeface="ヒラギノ角ゴ ProN W3" charset="0"/>
                 <a:cs typeface="ヒラギノ角ゴ ProN W3" charset="0"/>
               </a:rPr>
-              <a:t>March 2019</a:t>
+              <a:t>March 2020</a:t>
             </a:r>
           </a:p>
         </p:txBody>
@@ -4321,8 +4317,16 @@
               <a:buNone/>
             </a:pPr>
             <a:r>
-              <a:rPr lang="en-US" dirty="0"/>
-              <a:t>INSERT INTO person </a:t>
+              <a:rPr lang="en-US" dirty="0">
+                <a:solidFill>
+                  <a:schemeClr val="accent1"/>
+                </a:solidFill>
+              </a:rPr>
+              <a:t>INSERT INTO </a:t>
+            </a:r>
+            <a:r>
+              <a:rPr lang="en-US" dirty="0"/>
+              <a:t>Person </a:t>
             </a:r>
             <a:br>
               <a:rPr lang="en-US" dirty="0"/>
@@ -4360,8 +4364,16 @@
               <a:buNone/>
             </a:pPr>
             <a:r>
-              <a:rPr lang="en-US" dirty="0"/>
-              <a:t>INSERT INTO person </a:t>
+              <a:rPr lang="en-US" dirty="0">
+                <a:solidFill>
+                  <a:schemeClr val="accent1"/>
+                </a:solidFill>
+              </a:rPr>
+              <a:t>INSERT INTO </a:t>
+            </a:r>
+            <a:r>
+              <a:rPr lang="en-US" dirty="0"/>
+              <a:t>Person </a:t>
             </a:r>
             <a:br>
               <a:rPr lang="en-US" dirty="0"/>
@@ -4472,8 +4484,28 @@
               <a:buNone/>
             </a:pPr>
             <a:r>
-              <a:rPr lang="en-US" dirty="0"/>
-              <a:t>SELECT * FROM person;</a:t>
+              <a:rPr lang="en-US" dirty="0">
+                <a:solidFill>
+                  <a:schemeClr val="accent1"/>
+                </a:solidFill>
+              </a:rPr>
+              <a:t>SELECT</a:t>
+            </a:r>
+            <a:r>
+              <a:rPr lang="en-US" dirty="0"/>
+              <a:t> * </a:t>
+            </a:r>
+            <a:r>
+              <a:rPr lang="en-US" dirty="0">
+                <a:solidFill>
+                  <a:schemeClr val="accent1"/>
+                </a:solidFill>
+              </a:rPr>
+              <a:t>FROM</a:t>
+            </a:r>
+            <a:r>
+              <a:rPr lang="en-US" dirty="0"/>
+              <a:t> Person;</a:t>
             </a:r>
           </a:p>
           <a:p>
@@ -4661,8 +4693,40 @@
               <a:buNone/>
             </a:pPr>
             <a:r>
-              <a:rPr lang="en-US" dirty="0"/>
-              <a:t>SELECT * FROM person WHERE id = 564;</a:t>
+              <a:rPr lang="en-US" dirty="0">
+                <a:solidFill>
+                  <a:schemeClr val="accent1"/>
+                </a:solidFill>
+              </a:rPr>
+              <a:t>SELECT</a:t>
+            </a:r>
+            <a:r>
+              <a:rPr lang="en-US" dirty="0"/>
+              <a:t> * </a:t>
+            </a:r>
+            <a:r>
+              <a:rPr lang="en-US" dirty="0">
+                <a:solidFill>
+                  <a:schemeClr val="accent1"/>
+                </a:solidFill>
+              </a:rPr>
+              <a:t>FROM </a:t>
+            </a:r>
+            <a:r>
+              <a:rPr lang="en-US" dirty="0"/>
+              <a:t>Person </a:t>
+            </a:r>
+            <a:r>
+              <a:rPr lang="en-US" dirty="0">
+                <a:solidFill>
+                  <a:schemeClr val="accent1"/>
+                </a:solidFill>
+              </a:rPr>
+              <a:t>WHERE</a:t>
+            </a:r>
+            <a:r>
+              <a:rPr lang="en-US" dirty="0"/>
+              <a:t> id = 564;</a:t>
             </a:r>
           </a:p>
           <a:p>
@@ -4813,8 +4877,40 @@
               <a:buNone/>
             </a:pPr>
             <a:r>
-              <a:rPr lang="en-US" dirty="0"/>
-              <a:t>SELECT * FROM person WHERE </a:t>
+              <a:rPr lang="en-US" dirty="0">
+                <a:solidFill>
+                  <a:schemeClr val="accent1"/>
+                </a:solidFill>
+              </a:rPr>
+              <a:t>SELECT</a:t>
+            </a:r>
+            <a:r>
+              <a:rPr lang="en-US" dirty="0"/>
+              <a:t> * </a:t>
+            </a:r>
+            <a:r>
+              <a:rPr lang="en-US" dirty="0">
+                <a:solidFill>
+                  <a:schemeClr val="accent1"/>
+                </a:solidFill>
+              </a:rPr>
+              <a:t>FROM</a:t>
+            </a:r>
+            <a:r>
+              <a:rPr lang="en-US" dirty="0"/>
+              <a:t> Person </a:t>
+            </a:r>
+            <a:r>
+              <a:rPr lang="en-US" dirty="0">
+                <a:solidFill>
+                  <a:schemeClr val="accent1"/>
+                </a:solidFill>
+              </a:rPr>
+              <a:t>WHERE</a:t>
+            </a:r>
+            <a:r>
+              <a:rPr lang="en-US" dirty="0"/>
+              <a:t> </a:t>
             </a:r>
             <a:r>
               <a:rPr lang="en-US" dirty="0" err="1"/>
@@ -4998,8 +5094,16 @@
               <a:buNone/>
             </a:pPr>
             <a:r>
+              <a:rPr lang="en-US" sz="2800" dirty="0">
+                <a:solidFill>
+                  <a:schemeClr val="accent1"/>
+                </a:solidFill>
+              </a:rPr>
+              <a:t>SELECT</a:t>
+            </a:r>
+            <a:r>
               <a:rPr lang="en-US" sz="2800" dirty="0"/>
-              <a:t>SELECT </a:t>
+              <a:t> </a:t>
             </a:r>
             <a:r>
               <a:rPr lang="en-US" sz="2800" dirty="0" err="1"/>
@@ -5015,14 +5119,34 @@
             </a:r>
             <a:r>
               <a:rPr lang="en-US" sz="2800" dirty="0"/>
-              <a:t> FROM person     </a:t>
+              <a:t> </a:t>
+            </a:r>
+            <a:r>
+              <a:rPr lang="en-US" sz="2800" dirty="0">
+                <a:solidFill>
+                  <a:schemeClr val="accent1"/>
+                </a:solidFill>
+              </a:rPr>
+              <a:t>FROM</a:t>
+            </a:r>
+            <a:r>
+              <a:rPr lang="en-US" sz="2800" dirty="0"/>
+              <a:t> Person     </a:t>
             </a:r>
             <a:br>
               <a:rPr lang="en-US" sz="2800" dirty="0"/>
             </a:br>
             <a:r>
               <a:rPr lang="en-US" sz="2800" dirty="0"/>
-              <a:t>     ORDER BY </a:t>
+              <a:t>     </a:t>
+            </a:r>
+            <a:r>
+              <a:rPr lang="en-US" sz="2800" dirty="0">
+                <a:solidFill>
+                  <a:schemeClr val="accent1"/>
+                </a:solidFill>
+              </a:rPr>
+              <a:t>ORDER BY </a:t>
             </a:r>
             <a:r>
               <a:rPr lang="en-US" sz="2800" dirty="0" err="1"/>
@@ -5181,8 +5305,16 @@
               <a:buNone/>
             </a:pPr>
             <a:r>
+              <a:rPr lang="en-US" sz="2800" dirty="0">
+                <a:solidFill>
+                  <a:schemeClr val="accent1"/>
+                </a:solidFill>
+              </a:rPr>
+              <a:t>SELECT</a:t>
+            </a:r>
+            <a:r>
               <a:rPr lang="en-US" sz="2800" dirty="0"/>
-              <a:t>SELECT </a:t>
+              <a:t> </a:t>
             </a:r>
             <a:r>
               <a:rPr lang="en-US" sz="2800" dirty="0" err="1"/>
@@ -5190,14 +5322,34 @@
             </a:r>
             <a:r>
               <a:rPr lang="en-US" sz="2800" dirty="0"/>
-              <a:t> FROM person     </a:t>
+              <a:t> </a:t>
+            </a:r>
+            <a:r>
+              <a:rPr lang="en-US" sz="2800" dirty="0">
+                <a:solidFill>
+                  <a:schemeClr val="accent1"/>
+                </a:solidFill>
+              </a:rPr>
+              <a:t>FROM</a:t>
+            </a:r>
+            <a:r>
+              <a:rPr lang="en-US" sz="2800" dirty="0"/>
+              <a:t> Person     </a:t>
             </a:r>
             <a:br>
               <a:rPr lang="en-US" sz="2800" dirty="0"/>
             </a:br>
             <a:r>
               <a:rPr lang="en-US" sz="2800" dirty="0"/>
-              <a:t>     ORDER BY </a:t>
+              <a:t>     </a:t>
+            </a:r>
+            <a:r>
+              <a:rPr lang="en-US" sz="2800" dirty="0">
+                <a:solidFill>
+                  <a:schemeClr val="accent1"/>
+                </a:solidFill>
+              </a:rPr>
+              <a:t>ORDER BY </a:t>
             </a:r>
             <a:r>
               <a:rPr lang="en-US" sz="2800" dirty="0" err="1"/>
@@ -5421,7 +5573,11 @@
               <a:buNone/>
             </a:pPr>
             <a:r>
-              <a:rPr lang="en-US" sz="2800" dirty="0"/>
+              <a:rPr lang="en-US" sz="2800" dirty="0">
+                <a:solidFill>
+                  <a:schemeClr val="accent1"/>
+                </a:solidFill>
+              </a:rPr>
               <a:t>SELECT DISTINCT </a:t>
             </a:r>
             <a:r>
@@ -5430,14 +5586,34 @@
             </a:r>
             <a:r>
               <a:rPr lang="en-US" sz="2800" dirty="0"/>
-              <a:t> FROM person     </a:t>
+              <a:t> </a:t>
+            </a:r>
+            <a:r>
+              <a:rPr lang="en-US" sz="2800" dirty="0">
+                <a:solidFill>
+                  <a:schemeClr val="accent1"/>
+                </a:solidFill>
+              </a:rPr>
+              <a:t>FROM</a:t>
+            </a:r>
+            <a:r>
+              <a:rPr lang="en-US" sz="2800" dirty="0"/>
+              <a:t> Person     </a:t>
             </a:r>
             <a:br>
               <a:rPr lang="en-US" sz="2800" dirty="0"/>
             </a:br>
             <a:r>
               <a:rPr lang="en-US" sz="2800" dirty="0"/>
-              <a:t>     ORDER BY </a:t>
+              <a:t>     </a:t>
+            </a:r>
+            <a:r>
+              <a:rPr lang="en-US" sz="2800" dirty="0">
+                <a:solidFill>
+                  <a:schemeClr val="accent1"/>
+                </a:solidFill>
+              </a:rPr>
+              <a:t>ORDER BY </a:t>
             </a:r>
             <a:r>
               <a:rPr lang="en-US" sz="2800" dirty="0" err="1"/>
@@ -5571,10 +5747,20 @@
             </a:pPr>
             <a:r>
               <a:rPr lang="en-US" sz="2400" dirty="0">
+                <a:solidFill>
+                  <a:schemeClr val="accent1"/>
+                </a:solidFill>
                 <a:latin typeface="Menlo Bold"/>
                 <a:cs typeface="Menlo Bold"/>
               </a:rPr>
-              <a:t>SELECT </a:t>
+              <a:t>SELECT</a:t>
+            </a:r>
+            <a:r>
+              <a:rPr lang="en-US" sz="2400" dirty="0">
+                <a:latin typeface="Menlo Bold"/>
+                <a:cs typeface="Menlo Bold"/>
+              </a:rPr>
+              <a:t> </a:t>
             </a:r>
             <a:r>
               <a:rPr lang="en-US" sz="2400" dirty="0" err="1">
@@ -5602,7 +5788,24 @@
                 <a:latin typeface="Menlo Bold"/>
                 <a:cs typeface="Menlo Bold"/>
               </a:rPr>
-              <a:t> FROM person </a:t>
+              <a:t> </a:t>
+            </a:r>
+            <a:r>
+              <a:rPr lang="en-US" sz="2400" dirty="0">
+                <a:solidFill>
+                  <a:schemeClr val="accent1"/>
+                </a:solidFill>
+                <a:latin typeface="Menlo Bold"/>
+                <a:cs typeface="Menlo Bold"/>
+              </a:rPr>
+              <a:t>FROM</a:t>
+            </a:r>
+            <a:r>
+              <a:rPr lang="en-US" sz="2400" dirty="0">
+                <a:latin typeface="Menlo Bold"/>
+                <a:cs typeface="Menlo Bold"/>
+              </a:rPr>
+              <a:t> Person </a:t>
             </a:r>
             <a:br>
               <a:rPr lang="en-US" sz="2400" dirty="0">
@@ -5615,7 +5818,17 @@
                 <a:latin typeface="Menlo Bold"/>
                 <a:cs typeface="Menlo Bold"/>
               </a:rPr>
-              <a:t>	ORDER BY </a:t>
+              <a:t>	</a:t>
+            </a:r>
+            <a:r>
+              <a:rPr lang="en-US" sz="2400" dirty="0">
+                <a:solidFill>
+                  <a:schemeClr val="accent1"/>
+                </a:solidFill>
+                <a:latin typeface="Menlo Bold"/>
+                <a:cs typeface="Menlo Bold"/>
+              </a:rPr>
+              <a:t>ORDER BY </a:t>
             </a:r>
             <a:r>
               <a:rPr lang="en-US" sz="2400" dirty="0" err="1">
@@ -5629,7 +5842,24 @@
                 <a:latin typeface="Menlo Bold"/>
                 <a:cs typeface="Menlo Bold"/>
               </a:rPr>
-              <a:t> LIMIT 1;</a:t>
+              <a:t> </a:t>
+            </a:r>
+            <a:r>
+              <a:rPr lang="en-US" sz="2400" dirty="0">
+                <a:solidFill>
+                  <a:schemeClr val="accent1"/>
+                </a:solidFill>
+                <a:latin typeface="Menlo Bold"/>
+                <a:cs typeface="Menlo Bold"/>
+              </a:rPr>
+              <a:t>LIMIT</a:t>
+            </a:r>
+            <a:r>
+              <a:rPr lang="en-US" sz="2400" dirty="0">
+                <a:latin typeface="Menlo Bold"/>
+                <a:cs typeface="Menlo Bold"/>
+              </a:rPr>
+              <a:t> 1;</a:t>
             </a:r>
           </a:p>
           <a:p>
@@ -5781,10 +6011,37 @@
             </a:pPr>
             <a:r>
               <a:rPr lang="en-US" sz="2800" dirty="0">
+                <a:solidFill>
+                  <a:schemeClr val="accent1"/>
+                </a:solidFill>
                 <a:latin typeface="Menlo Bold"/>
                 <a:cs typeface="Menlo Bold"/>
               </a:rPr>
-              <a:t>SELECT AVG(birthdate) FROM person;</a:t>
+              <a:t>SELECT</a:t>
+            </a:r>
+            <a:r>
+              <a:rPr lang="en-US" sz="2800" dirty="0">
+                <a:latin typeface="Menlo Bold"/>
+                <a:cs typeface="Menlo Bold"/>
+              </a:rPr>
+              <a:t> AVG(birthdate) </a:t>
+            </a:r>
+            <a:r>
+              <a:rPr lang="en-US" sz="2800" dirty="0">
+                <a:solidFill>
+                  <a:schemeClr val="accent1"/>
+                </a:solidFill>
+                <a:latin typeface="Menlo Bold"/>
+                <a:cs typeface="Menlo Bold"/>
+              </a:rPr>
+              <a:t>FROM </a:t>
+            </a:r>
+            <a:r>
+              <a:rPr lang="en-US" sz="2800" dirty="0">
+                <a:latin typeface="Menlo Bold"/>
+                <a:cs typeface="Menlo Bold"/>
+              </a:rPr>
+              <a:t>Person;</a:t>
             </a:r>
           </a:p>
           <a:p>
@@ -6166,6 +6423,248 @@
       </p:grpSpPr>
       <p:sp>
         <p:nvSpPr>
+          <p:cNvPr id="2" name="Title 1">
+            <a:extLst>
+              <a:ext uri="{FF2B5EF4-FFF2-40B4-BE49-F238E27FC236}">
+                <a16:creationId xmlns:a16="http://schemas.microsoft.com/office/drawing/2014/main" id="{2327FE2F-6741-DF48-88CA-4D0DC1CA7245}"/>
+              </a:ext>
+            </a:extLst>
+          </p:cNvPr>
+          <p:cNvSpPr>
+            <a:spLocks noGrp="1"/>
+          </p:cNvSpPr>
+          <p:nvPr>
+            <p:ph type="title"/>
+          </p:nvPr>
+        </p:nvSpPr>
+        <p:spPr/>
+        <p:txBody>
+          <a:bodyPr/>
+          <a:lstStyle/>
+          <a:p>
+            <a:r>
+              <a:rPr lang="en-US" dirty="0"/>
+              <a:t>JOIN</a:t>
+            </a:r>
+          </a:p>
+        </p:txBody>
+      </p:sp>
+      <p:sp>
+        <p:nvSpPr>
+          <p:cNvPr id="3" name="Content Placeholder 2">
+            <a:extLst>
+              <a:ext uri="{FF2B5EF4-FFF2-40B4-BE49-F238E27FC236}">
+                <a16:creationId xmlns:a16="http://schemas.microsoft.com/office/drawing/2014/main" id="{4DAF00F6-2326-FF49-9E39-B8FF762A6F4D}"/>
+              </a:ext>
+            </a:extLst>
+          </p:cNvPr>
+          <p:cNvSpPr>
+            <a:spLocks noGrp="1"/>
+          </p:cNvSpPr>
+          <p:nvPr>
+            <p:ph idx="1"/>
+          </p:nvPr>
+        </p:nvSpPr>
+        <p:spPr/>
+        <p:txBody>
+          <a:bodyPr/>
+          <a:lstStyle/>
+          <a:p>
+            <a:pPr marL="0" indent="0">
+              <a:buNone/>
+            </a:pPr>
+            <a:r>
+              <a:rPr lang="en-US" dirty="0">
+                <a:solidFill>
+                  <a:schemeClr val="accent1"/>
+                </a:solidFill>
+              </a:rPr>
+              <a:t>SELECT DISTINCT </a:t>
+            </a:r>
+            <a:r>
+              <a:rPr lang="en-US" dirty="0" err="1"/>
+              <a:t>lastname</a:t>
+            </a:r>
+            <a:r>
+              <a:rPr lang="en-US" dirty="0"/>
+              <a:t>, </a:t>
+            </a:r>
+            <a:r>
+              <a:rPr lang="en-US" dirty="0" err="1"/>
+              <a:t>firstname</a:t>
+            </a:r>
+            <a:r>
+              <a:rPr lang="en-US" dirty="0"/>
+              <a:t> </a:t>
+            </a:r>
+            <a:r>
+              <a:rPr lang="en-US" dirty="0">
+                <a:solidFill>
+                  <a:schemeClr val="accent1"/>
+                </a:solidFill>
+              </a:rPr>
+              <a:t>FROM</a:t>
+            </a:r>
+            <a:r>
+              <a:rPr lang="en-US" dirty="0"/>
+              <a:t> 	Person </a:t>
+            </a:r>
+            <a:r>
+              <a:rPr lang="en-US" dirty="0">
+                <a:solidFill>
+                  <a:schemeClr val="accent1"/>
+                </a:solidFill>
+              </a:rPr>
+              <a:t>INNER JOIN </a:t>
+            </a:r>
+            <a:r>
+              <a:rPr lang="en-US" dirty="0"/>
+              <a:t>Manager ON Person(id) = 	Manager(id)</a:t>
+            </a:r>
+          </a:p>
+          <a:p>
+            <a:pPr marL="0" indent="0">
+              <a:buNone/>
+            </a:pPr>
+            <a:endParaRPr lang="en-US" dirty="0"/>
+          </a:p>
+          <a:p>
+            <a:pPr marL="0" indent="0">
+              <a:buNone/>
+            </a:pPr>
+            <a:r>
+              <a:rPr lang="en-US" dirty="0" err="1">
+                <a:latin typeface="Menlo Bold"/>
+                <a:cs typeface="Menlo Bold"/>
+              </a:rPr>
+              <a:t>firstname</a:t>
+            </a:r>
+            <a:r>
+              <a:rPr lang="en-US" dirty="0">
+                <a:latin typeface="Menlo Bold"/>
+                <a:cs typeface="Menlo Bold"/>
+              </a:rPr>
+              <a:t>   </a:t>
+            </a:r>
+            <a:r>
+              <a:rPr lang="en-US" dirty="0" err="1">
+                <a:latin typeface="Menlo Bold"/>
+                <a:cs typeface="Menlo Bold"/>
+              </a:rPr>
+              <a:t>lastname</a:t>
+            </a:r>
+            <a:r>
+              <a:rPr lang="en-US" dirty="0">
+                <a:latin typeface="Menlo Bold"/>
+                <a:cs typeface="Menlo Bold"/>
+              </a:rPr>
+              <a:t>  </a:t>
+            </a:r>
+          </a:p>
+          <a:p>
+            <a:pPr marL="0" indent="0">
+              <a:buNone/>
+            </a:pPr>
+            <a:r>
+              <a:rPr lang="en-US" dirty="0">
+                <a:latin typeface="Menlo Bold"/>
+                <a:cs typeface="Menlo Bold"/>
+              </a:rPr>
+              <a:t>----------  ----------</a:t>
+            </a:r>
+          </a:p>
+          <a:p>
+            <a:pPr marL="0" indent="0">
+              <a:buNone/>
+            </a:pPr>
+            <a:r>
+              <a:rPr lang="en-US" dirty="0">
+                <a:latin typeface="Menlo Bold"/>
+                <a:cs typeface="Menlo Bold"/>
+              </a:rPr>
+              <a:t>Eleanor     Smith     </a:t>
+            </a:r>
+          </a:p>
+          <a:p>
+            <a:pPr marL="0" indent="0">
+              <a:buNone/>
+            </a:pPr>
+            <a:endParaRPr lang="en-US" dirty="0"/>
+          </a:p>
+        </p:txBody>
+      </p:sp>
+      <p:sp>
+        <p:nvSpPr>
+          <p:cNvPr id="4" name="TextBox 3">
+            <a:extLst>
+              <a:ext uri="{FF2B5EF4-FFF2-40B4-BE49-F238E27FC236}">
+                <a16:creationId xmlns:a16="http://schemas.microsoft.com/office/drawing/2014/main" id="{1CFE2BA8-8ECD-044D-9108-7AFF429DF5C1}"/>
+              </a:ext>
+            </a:extLst>
+          </p:cNvPr>
+          <p:cNvSpPr txBox="1"/>
+          <p:nvPr/>
+        </p:nvSpPr>
+        <p:spPr>
+          <a:xfrm>
+            <a:off x="6477000" y="4267200"/>
+            <a:ext cx="2377440" cy="1200329"/>
+          </a:xfrm>
+          <a:prstGeom prst="rect">
+            <a:avLst/>
+          </a:prstGeom>
+          <a:noFill/>
+          <a:ln>
+            <a:solidFill>
+              <a:schemeClr val="accent1"/>
+            </a:solidFill>
+          </a:ln>
+        </p:spPr>
+        <p:txBody>
+          <a:bodyPr wrap="square" rtlCol="0">
+            <a:spAutoFit/>
+          </a:bodyPr>
+          <a:lstStyle/>
+          <a:p>
+            <a:r>
+              <a:rPr lang="en-US" sz="2400" dirty="0"/>
+              <a:t>What does this tell us about Eleanor Smith?</a:t>
+            </a:r>
+          </a:p>
+        </p:txBody>
+      </p:sp>
+    </p:spTree>
+    <p:extLst>
+      <p:ext uri="{BB962C8B-B14F-4D97-AF65-F5344CB8AC3E}">
+        <p14:creationId xmlns:p14="http://schemas.microsoft.com/office/powerpoint/2010/main" val="146047244"/>
+      </p:ext>
+    </p:extLst>
+  </p:cSld>
+  <p:clrMapOvr>
+    <a:masterClrMapping/>
+  </p:clrMapOvr>
+</p:sld>
+</file>
+
+<file path=ppt/slides/slide22.xml><?xml version="1.0" encoding="utf-8"?>
+<p:sld xmlns:a="http://schemas.openxmlformats.org/drawingml/2006/main" xmlns:r="http://schemas.openxmlformats.org/officeDocument/2006/relationships" xmlns:p="http://schemas.openxmlformats.org/presentationml/2006/main">
+  <p:cSld>
+    <p:spTree>
+      <p:nvGrpSpPr>
+        <p:cNvPr id="1" name=""/>
+        <p:cNvGrpSpPr/>
+        <p:nvPr/>
+      </p:nvGrpSpPr>
+      <p:grpSpPr>
+        <a:xfrm>
+          <a:off x="0" y="0"/>
+          <a:ext cx="0" cy="0"/>
+          <a:chOff x="0" y="0"/>
+          <a:chExt cx="0" cy="0"/>
+        </a:xfrm>
+      </p:grpSpPr>
+      <p:sp>
+        <p:nvSpPr>
           <p:cNvPr id="2" name="Title 1"/>
           <p:cNvSpPr>
             <a:spLocks noGrp="1"/>
@@ -6263,7 +6762,7 @@
 </p:sld>
 </file>
 
-<file path=ppt/slides/slide22.xml><?xml version="1.0" encoding="utf-8"?>
+<file path=ppt/slides/slide23.xml><?xml version="1.0" encoding="utf-8"?>
 <p:sld xmlns:a="http://schemas.openxmlformats.org/drawingml/2006/main" xmlns:r="http://schemas.openxmlformats.org/officeDocument/2006/relationships" xmlns:p="http://schemas.openxmlformats.org/presentationml/2006/main">
   <p:cSld>
     <p:spTree>
@@ -6415,465 +6914,6 @@
 </p:sld>
 </file>
 
-<file path=ppt/slides/slide23.xml><?xml version="1.0" encoding="utf-8"?>
-<p:sld xmlns:a="http://schemas.openxmlformats.org/drawingml/2006/main" xmlns:r="http://schemas.openxmlformats.org/officeDocument/2006/relationships" xmlns:p="http://schemas.openxmlformats.org/presentationml/2006/main">
-  <p:cSld>
-    <p:spTree>
-      <p:nvGrpSpPr>
-        <p:cNvPr id="1" name=""/>
-        <p:cNvGrpSpPr/>
-        <p:nvPr/>
-      </p:nvGrpSpPr>
-      <p:grpSpPr>
-        <a:xfrm>
-          <a:off x="0" y="0"/>
-          <a:ext cx="0" cy="0"/>
-          <a:chOff x="0" y="0"/>
-          <a:chExt cx="0" cy="0"/>
-        </a:xfrm>
-      </p:grpSpPr>
-      <p:sp>
-        <p:nvSpPr>
-          <p:cNvPr id="2" name="Title 1"/>
-          <p:cNvSpPr>
-            <a:spLocks noGrp="1"/>
-          </p:cNvSpPr>
-          <p:nvPr>
-            <p:ph type="title"/>
-          </p:nvPr>
-        </p:nvSpPr>
-        <p:spPr/>
-        <p:txBody>
-          <a:bodyPr/>
-          <a:lstStyle/>
-          <a:p>
-            <a:r>
-              <a:rPr lang="en-US" dirty="0"/>
-              <a:t>Hive example</a:t>
-            </a:r>
-          </a:p>
-        </p:txBody>
-      </p:sp>
-      <p:sp>
-        <p:nvSpPr>
-          <p:cNvPr id="3" name="Content Placeholder 2"/>
-          <p:cNvSpPr>
-            <a:spLocks noGrp="1"/>
-          </p:cNvSpPr>
-          <p:nvPr>
-            <p:ph idx="1"/>
-          </p:nvPr>
-        </p:nvSpPr>
-        <p:spPr/>
-        <p:txBody>
-          <a:bodyPr>
-            <a:normAutofit fontScale="47500" lnSpcReduction="20000"/>
-          </a:bodyPr>
-          <a:lstStyle/>
-          <a:p>
-            <a:pPr marL="0" indent="0">
-              <a:buNone/>
-            </a:pPr>
-            <a:r>
-              <a:rPr lang="en-US" dirty="0">
-                <a:latin typeface="Lucida Console"/>
-                <a:cs typeface="Lucida Console"/>
-              </a:rPr>
-              <a:t>CREATE TABLE </a:t>
-            </a:r>
-            <a:r>
-              <a:rPr lang="en-US" dirty="0" err="1">
-                <a:latin typeface="Lucida Console"/>
-                <a:cs typeface="Lucida Console"/>
-              </a:rPr>
-              <a:t>page_view</a:t>
-            </a:r>
-            <a:r>
-              <a:rPr lang="en-US" dirty="0">
-                <a:latin typeface="Lucida Console"/>
-                <a:cs typeface="Lucida Console"/>
-              </a:rPr>
-              <a:t>(</a:t>
-            </a:r>
-            <a:r>
-              <a:rPr lang="en-US" dirty="0" err="1">
-                <a:latin typeface="Lucida Console"/>
-                <a:cs typeface="Lucida Console"/>
-              </a:rPr>
-              <a:t>viewTime</a:t>
-            </a:r>
-            <a:r>
-              <a:rPr lang="en-US" dirty="0">
-                <a:latin typeface="Lucida Console"/>
-                <a:cs typeface="Lucida Console"/>
-              </a:rPr>
-              <a:t> INT, </a:t>
-            </a:r>
-            <a:r>
-              <a:rPr lang="en-US" dirty="0" err="1">
-                <a:latin typeface="Lucida Console"/>
-                <a:cs typeface="Lucida Console"/>
-              </a:rPr>
-              <a:t>userid</a:t>
-            </a:r>
-            <a:r>
-              <a:rPr lang="en-US" dirty="0">
-                <a:latin typeface="Lucida Console"/>
-                <a:cs typeface="Lucida Console"/>
-              </a:rPr>
-              <a:t> BIGINT,</a:t>
-            </a:r>
-          </a:p>
-          <a:p>
-            <a:pPr marL="0" indent="0">
-              <a:buNone/>
-            </a:pPr>
-            <a:r>
-              <a:rPr lang="en-US" dirty="0">
-                <a:latin typeface="Lucida Console"/>
-                <a:cs typeface="Lucida Console"/>
-              </a:rPr>
-              <a:t>                </a:t>
-            </a:r>
-            <a:r>
-              <a:rPr lang="en-US" dirty="0" err="1">
-                <a:latin typeface="Lucida Console"/>
-                <a:cs typeface="Lucida Console"/>
-              </a:rPr>
-              <a:t>page_url</a:t>
-            </a:r>
-            <a:r>
-              <a:rPr lang="en-US" dirty="0">
-                <a:latin typeface="Lucida Console"/>
-                <a:cs typeface="Lucida Console"/>
-              </a:rPr>
-              <a:t> STRING, </a:t>
-            </a:r>
-            <a:r>
-              <a:rPr lang="en-US" dirty="0" err="1">
-                <a:latin typeface="Lucida Console"/>
-                <a:cs typeface="Lucida Console"/>
-              </a:rPr>
-              <a:t>referrer_url</a:t>
-            </a:r>
-            <a:r>
-              <a:rPr lang="en-US" dirty="0">
-                <a:latin typeface="Lucida Console"/>
-                <a:cs typeface="Lucida Console"/>
-              </a:rPr>
-              <a:t> STRING,</a:t>
-            </a:r>
-          </a:p>
-          <a:p>
-            <a:pPr marL="0" indent="0">
-              <a:buNone/>
-            </a:pPr>
-            <a:r>
-              <a:rPr lang="en-US" dirty="0">
-                <a:latin typeface="Lucida Console"/>
-                <a:cs typeface="Lucida Console"/>
-              </a:rPr>
-              <a:t>                </a:t>
-            </a:r>
-            <a:r>
-              <a:rPr lang="en-US" dirty="0" err="1">
-                <a:latin typeface="Lucida Console"/>
-                <a:cs typeface="Lucida Console"/>
-              </a:rPr>
-              <a:t>ip</a:t>
-            </a:r>
-            <a:r>
-              <a:rPr lang="en-US" dirty="0">
-                <a:latin typeface="Lucida Console"/>
-                <a:cs typeface="Lucida Console"/>
-              </a:rPr>
-              <a:t> STRING COMMENT 'IP Address of the User')</a:t>
-            </a:r>
-          </a:p>
-          <a:p>
-            <a:pPr marL="0" indent="0">
-              <a:buNone/>
-            </a:pPr>
-            <a:r>
-              <a:rPr lang="en-US" dirty="0">
-                <a:latin typeface="Lucida Console"/>
-                <a:cs typeface="Lucida Console"/>
-              </a:rPr>
-              <a:t>COMMENT 'This is the page view table'</a:t>
-            </a:r>
-          </a:p>
-          <a:p>
-            <a:pPr marL="0" indent="0">
-              <a:buNone/>
-            </a:pPr>
-            <a:r>
-              <a:rPr lang="en-US" dirty="0">
-                <a:latin typeface="Lucida Console"/>
-                <a:cs typeface="Lucida Console"/>
-              </a:rPr>
-              <a:t>PARTITIONED BY(</a:t>
-            </a:r>
-            <a:r>
-              <a:rPr lang="en-US" dirty="0" err="1">
-                <a:latin typeface="Lucida Console"/>
-                <a:cs typeface="Lucida Console"/>
-              </a:rPr>
-              <a:t>dt</a:t>
-            </a:r>
-            <a:r>
-              <a:rPr lang="en-US" dirty="0">
-                <a:latin typeface="Lucida Console"/>
-                <a:cs typeface="Lucida Console"/>
-              </a:rPr>
-              <a:t> STRING, country STRING)</a:t>
-            </a:r>
-          </a:p>
-          <a:p>
-            <a:pPr marL="0" indent="0">
-              <a:buNone/>
-            </a:pPr>
-            <a:r>
-              <a:rPr lang="en-US" dirty="0">
-                <a:latin typeface="Lucida Console"/>
-                <a:cs typeface="Lucida Console"/>
-              </a:rPr>
-              <a:t>STORED AS SEQUENCEFILE;</a:t>
-            </a:r>
-          </a:p>
-          <a:p>
-            <a:pPr marL="0" indent="0">
-              <a:buNone/>
-            </a:pPr>
-            <a:endParaRPr lang="en-US" dirty="0">
-              <a:latin typeface="Lucida Console"/>
-              <a:cs typeface="Lucida Console"/>
-            </a:endParaRPr>
-          </a:p>
-          <a:p>
-            <a:pPr marL="0" indent="0">
-              <a:buNone/>
-            </a:pPr>
-            <a:endParaRPr lang="en-US" dirty="0">
-              <a:latin typeface="Lucida Console"/>
-              <a:cs typeface="Lucida Console"/>
-            </a:endParaRPr>
-          </a:p>
-          <a:p>
-            <a:pPr marL="0" indent="0">
-              <a:buNone/>
-            </a:pPr>
-            <a:r>
-              <a:rPr lang="en-US" dirty="0">
-                <a:latin typeface="Lucida Console"/>
-                <a:cs typeface="Lucida Console"/>
-              </a:rPr>
-              <a:t>LOAD DATA LOCAL INPATH /</a:t>
-            </a:r>
-            <a:r>
-              <a:rPr lang="en-US" dirty="0" err="1">
-                <a:latin typeface="Lucida Console"/>
-                <a:cs typeface="Lucida Console"/>
-              </a:rPr>
-              <a:t>tmp</a:t>
-            </a:r>
-            <a:r>
-              <a:rPr lang="en-US" dirty="0">
-                <a:latin typeface="Lucida Console"/>
-                <a:cs typeface="Lucida Console"/>
-              </a:rPr>
-              <a:t>/pv_2008-06-08_us.txt INTO TABLE </a:t>
-            </a:r>
-            <a:r>
-              <a:rPr lang="en-US" dirty="0" err="1">
-                <a:latin typeface="Lucida Console"/>
-                <a:cs typeface="Lucida Console"/>
-              </a:rPr>
-              <a:t>page_view</a:t>
-            </a:r>
-            <a:r>
-              <a:rPr lang="en-US" dirty="0">
-                <a:latin typeface="Lucida Console"/>
-                <a:cs typeface="Lucida Console"/>
-              </a:rPr>
-              <a:t> PARTITION(date='2008-06-08', country='US')</a:t>
-            </a:r>
-          </a:p>
-          <a:p>
-            <a:pPr marL="0" indent="0">
-              <a:buNone/>
-            </a:pPr>
-            <a:endParaRPr lang="en-US" dirty="0">
-              <a:latin typeface="Lucida Console"/>
-              <a:cs typeface="Lucida Console"/>
-            </a:endParaRPr>
-          </a:p>
-          <a:p>
-            <a:pPr marL="0" indent="0">
-              <a:buNone/>
-            </a:pPr>
-            <a:r>
-              <a:rPr lang="en-US" dirty="0">
-                <a:latin typeface="Lucida Console"/>
-                <a:cs typeface="Lucida Console"/>
-              </a:rPr>
-              <a:t>INSERT OVERWRITE TABLE </a:t>
-            </a:r>
-            <a:r>
-              <a:rPr lang="en-US" dirty="0" err="1">
-                <a:latin typeface="Lucida Console"/>
-                <a:cs typeface="Lucida Console"/>
-              </a:rPr>
-              <a:t>xyz_com_page_views</a:t>
-            </a:r>
-            <a:endParaRPr lang="en-US" dirty="0">
-              <a:latin typeface="Lucida Console"/>
-              <a:cs typeface="Lucida Console"/>
-            </a:endParaRPr>
-          </a:p>
-          <a:p>
-            <a:pPr marL="0" indent="0">
-              <a:buNone/>
-            </a:pPr>
-            <a:r>
-              <a:rPr lang="en-US" dirty="0">
-                <a:latin typeface="Lucida Console"/>
-                <a:cs typeface="Lucida Console"/>
-              </a:rPr>
-              <a:t>SELECT </a:t>
-            </a:r>
-            <a:r>
-              <a:rPr lang="en-US" dirty="0" err="1">
-                <a:latin typeface="Lucida Console"/>
-                <a:cs typeface="Lucida Console"/>
-              </a:rPr>
-              <a:t>page_views</a:t>
-            </a:r>
-            <a:r>
-              <a:rPr lang="en-US" dirty="0">
-                <a:latin typeface="Lucida Console"/>
-                <a:cs typeface="Lucida Console"/>
-              </a:rPr>
-              <a:t>.*</a:t>
-            </a:r>
-          </a:p>
-          <a:p>
-            <a:pPr marL="0" indent="0">
-              <a:buNone/>
-            </a:pPr>
-            <a:r>
-              <a:rPr lang="en-US" dirty="0">
-                <a:latin typeface="Lucida Console"/>
-                <a:cs typeface="Lucida Console"/>
-              </a:rPr>
-              <a:t>FROM </a:t>
-            </a:r>
-            <a:r>
-              <a:rPr lang="en-US" dirty="0" err="1">
-                <a:latin typeface="Lucida Console"/>
-                <a:cs typeface="Lucida Console"/>
-              </a:rPr>
-              <a:t>page_views</a:t>
-            </a:r>
-            <a:endParaRPr lang="en-US" dirty="0">
-              <a:latin typeface="Lucida Console"/>
-              <a:cs typeface="Lucida Console"/>
-            </a:endParaRPr>
-          </a:p>
-          <a:p>
-            <a:pPr marL="0" indent="0">
-              <a:buNone/>
-            </a:pPr>
-            <a:r>
-              <a:rPr lang="en-US" dirty="0">
-                <a:latin typeface="Lucida Console"/>
-                <a:cs typeface="Lucida Console"/>
-              </a:rPr>
-              <a:t>WHERE </a:t>
-            </a:r>
-            <a:r>
-              <a:rPr lang="en-US" dirty="0" err="1">
-                <a:latin typeface="Lucida Console"/>
-                <a:cs typeface="Lucida Console"/>
-              </a:rPr>
-              <a:t>page_views.date</a:t>
-            </a:r>
-            <a:r>
-              <a:rPr lang="en-US" dirty="0">
-                <a:latin typeface="Lucida Console"/>
-                <a:cs typeface="Lucida Console"/>
-              </a:rPr>
-              <a:t> &gt;= '2008-03-01' AND </a:t>
-            </a:r>
-            <a:r>
-              <a:rPr lang="en-US" dirty="0" err="1">
-                <a:latin typeface="Lucida Console"/>
-                <a:cs typeface="Lucida Console"/>
-              </a:rPr>
-              <a:t>page_views.date</a:t>
-            </a:r>
-            <a:r>
-              <a:rPr lang="en-US" dirty="0">
-                <a:latin typeface="Lucida Console"/>
-                <a:cs typeface="Lucida Console"/>
-              </a:rPr>
-              <a:t> &lt;= '2008-03-31' AND</a:t>
-            </a:r>
-          </a:p>
-          <a:p>
-            <a:pPr marL="0" indent="0">
-              <a:buNone/>
-            </a:pPr>
-            <a:r>
-              <a:rPr lang="en-US" dirty="0">
-                <a:latin typeface="Lucida Console"/>
-                <a:cs typeface="Lucida Console"/>
-              </a:rPr>
-              <a:t>      </a:t>
-            </a:r>
-            <a:r>
-              <a:rPr lang="en-US" dirty="0" err="1">
-                <a:latin typeface="Lucida Console"/>
-                <a:cs typeface="Lucida Console"/>
-              </a:rPr>
-              <a:t>page_views.referrer_url</a:t>
-            </a:r>
-            <a:r>
-              <a:rPr lang="en-US" dirty="0">
-                <a:latin typeface="Lucida Console"/>
-                <a:cs typeface="Lucida Console"/>
-              </a:rPr>
-              <a:t> like '%</a:t>
-            </a:r>
-            <a:r>
-              <a:rPr lang="en-US" dirty="0" err="1">
-                <a:latin typeface="Lucida Console"/>
-                <a:cs typeface="Lucida Console"/>
-              </a:rPr>
-              <a:t>xyz.com</a:t>
-            </a:r>
-            <a:r>
-              <a:rPr lang="en-US" dirty="0">
-                <a:latin typeface="Lucida Console"/>
-                <a:cs typeface="Lucida Console"/>
-              </a:rPr>
-              <a:t>';</a:t>
-            </a:r>
-          </a:p>
-        </p:txBody>
-      </p:sp>
-    </p:spTree>
-    <p:extLst>
-      <p:ext uri="{BB962C8B-B14F-4D97-AF65-F5344CB8AC3E}">
-        <p14:creationId xmlns:p14="http://schemas.microsoft.com/office/powerpoint/2010/main" val="2489775350"/>
-      </p:ext>
-    </p:extLst>
-  </p:cSld>
-  <p:clrMapOvr>
-    <a:masterClrMapping/>
-  </p:clrMapOvr>
-</p:sld>
-</file>
-
 <file path=ppt/slides/slide24.xml><?xml version="1.0" encoding="utf-8"?>
 <p:sld xmlns:a="http://schemas.openxmlformats.org/drawingml/2006/main" xmlns:r="http://schemas.openxmlformats.org/officeDocument/2006/relationships" xmlns:p="http://schemas.openxmlformats.org/presentationml/2006/main">
   <p:cSld>
@@ -6907,10 +6947,9 @@
           <a:lstStyle/>
           <a:p>
             <a:r>
-              <a:rPr lang="en-US" dirty="0" err="1"/>
-              <a:t>SparkSQL</a:t>
-            </a:r>
-            <a:endParaRPr lang="en-US" dirty="0"/>
+              <a:rPr lang="en-US" dirty="0"/>
+              <a:t>Hive example</a:t>
+            </a:r>
           </a:p>
         </p:txBody>
       </p:sp>
@@ -6927,65 +6966,396 @@
         <p:spPr/>
         <p:txBody>
           <a:bodyPr>
-            <a:normAutofit/>
+            <a:normAutofit fontScale="47500" lnSpcReduction="20000"/>
           </a:bodyPr>
           <a:lstStyle/>
           <a:p>
-            <a:r>
-              <a:rPr lang="en-US" dirty="0"/>
-              <a:t>Integrates into existing Spark programs</a:t>
-            </a:r>
-          </a:p>
-          <a:p>
-            <a:pPr lvl="1"/>
-            <a:r>
-              <a:rPr lang="en-US" dirty="0"/>
-              <a:t>Mixes SQL with Python, </a:t>
-            </a:r>
-            <a:r>
-              <a:rPr lang="en-US" dirty="0" err="1"/>
-              <a:t>Scala</a:t>
-            </a:r>
-            <a:r>
-              <a:rPr lang="en-US" dirty="0"/>
-              <a:t> or Java</a:t>
-            </a:r>
-          </a:p>
-          <a:p>
-            <a:r>
-              <a:rPr lang="en-US" dirty="0"/>
-              <a:t>Integrates data from CSV, Avro, Parquet, JDBC, ODBC, JSON, </a:t>
-            </a:r>
-            <a:r>
-              <a:rPr lang="en-US" dirty="0" err="1"/>
-              <a:t>etc</a:t>
-            </a:r>
-            <a:endParaRPr lang="en-US" dirty="0"/>
-          </a:p>
-          <a:p>
-            <a:pPr lvl="1"/>
-            <a:r>
-              <a:rPr lang="en-US" dirty="0"/>
-              <a:t>Including joins across them</a:t>
-            </a:r>
-          </a:p>
-          <a:p>
-            <a:r>
-              <a:rPr lang="en-US" dirty="0"/>
-              <a:t>Fully supports Apache Hive</a:t>
-            </a:r>
-          </a:p>
-          <a:p>
-            <a:pPr lvl="1"/>
-            <a:r>
-              <a:rPr lang="en-US" i="1" dirty="0"/>
-              <a:t>If you build it with Hive support</a:t>
-            </a:r>
-          </a:p>
-          <a:p>
-            <a:r>
-              <a:rPr lang="en-US" dirty="0"/>
-              <a:t>Fits into the resilient scalable model of Spark</a:t>
+            <a:pPr marL="0" indent="0">
+              <a:buNone/>
+            </a:pPr>
+            <a:r>
+              <a:rPr lang="en-US" dirty="0">
+                <a:latin typeface="Lucida Console"/>
+                <a:cs typeface="Lucida Console"/>
+              </a:rPr>
+              <a:t>CREATE TABLE </a:t>
+            </a:r>
+            <a:r>
+              <a:rPr lang="en-US" dirty="0" err="1">
+                <a:latin typeface="Lucida Console"/>
+                <a:cs typeface="Lucida Console"/>
+              </a:rPr>
+              <a:t>page_view</a:t>
+            </a:r>
+            <a:r>
+              <a:rPr lang="en-US" dirty="0">
+                <a:latin typeface="Lucida Console"/>
+                <a:cs typeface="Lucida Console"/>
+              </a:rPr>
+              <a:t>(</a:t>
+            </a:r>
+            <a:r>
+              <a:rPr lang="en-US" dirty="0" err="1">
+                <a:latin typeface="Lucida Console"/>
+                <a:cs typeface="Lucida Console"/>
+              </a:rPr>
+              <a:t>viewTime</a:t>
+            </a:r>
+            <a:r>
+              <a:rPr lang="en-US" dirty="0">
+                <a:latin typeface="Lucida Console"/>
+                <a:cs typeface="Lucida Console"/>
+              </a:rPr>
+              <a:t> INT, </a:t>
+            </a:r>
+            <a:r>
+              <a:rPr lang="en-US" dirty="0" err="1">
+                <a:latin typeface="Lucida Console"/>
+                <a:cs typeface="Lucida Console"/>
+              </a:rPr>
+              <a:t>userid</a:t>
+            </a:r>
+            <a:r>
+              <a:rPr lang="en-US" dirty="0">
+                <a:latin typeface="Lucida Console"/>
+                <a:cs typeface="Lucida Console"/>
+              </a:rPr>
+              <a:t> BIGINT,</a:t>
+            </a:r>
+          </a:p>
+          <a:p>
+            <a:pPr marL="0" indent="0">
+              <a:buNone/>
+            </a:pPr>
+            <a:r>
+              <a:rPr lang="en-US" dirty="0">
+                <a:latin typeface="Lucida Console"/>
+                <a:cs typeface="Lucida Console"/>
+              </a:rPr>
+              <a:t>                </a:t>
+            </a:r>
+            <a:r>
+              <a:rPr lang="en-US" dirty="0" err="1">
+                <a:latin typeface="Lucida Console"/>
+                <a:cs typeface="Lucida Console"/>
+              </a:rPr>
+              <a:t>page_url</a:t>
+            </a:r>
+            <a:r>
+              <a:rPr lang="en-US" dirty="0">
+                <a:latin typeface="Lucida Console"/>
+                <a:cs typeface="Lucida Console"/>
+              </a:rPr>
+              <a:t> STRING, </a:t>
+            </a:r>
+            <a:r>
+              <a:rPr lang="en-US" dirty="0" err="1">
+                <a:latin typeface="Lucida Console"/>
+                <a:cs typeface="Lucida Console"/>
+              </a:rPr>
+              <a:t>referrer_url</a:t>
+            </a:r>
+            <a:r>
+              <a:rPr lang="en-US" dirty="0">
+                <a:latin typeface="Lucida Console"/>
+                <a:cs typeface="Lucida Console"/>
+              </a:rPr>
+              <a:t> STRING,</a:t>
+            </a:r>
+          </a:p>
+          <a:p>
+            <a:pPr marL="0" indent="0">
+              <a:buNone/>
+            </a:pPr>
+            <a:r>
+              <a:rPr lang="en-US" dirty="0">
+                <a:latin typeface="Lucida Console"/>
+                <a:cs typeface="Lucida Console"/>
+              </a:rPr>
+              <a:t>                </a:t>
+            </a:r>
+            <a:r>
+              <a:rPr lang="en-US" dirty="0" err="1">
+                <a:latin typeface="Lucida Console"/>
+                <a:cs typeface="Lucida Console"/>
+              </a:rPr>
+              <a:t>ip</a:t>
+            </a:r>
+            <a:r>
+              <a:rPr lang="en-US" dirty="0">
+                <a:latin typeface="Lucida Console"/>
+                <a:cs typeface="Lucida Console"/>
+              </a:rPr>
+              <a:t> STRING COMMENT 'IP Address of the User')</a:t>
+            </a:r>
+          </a:p>
+          <a:p>
+            <a:pPr marL="0" indent="0">
+              <a:buNone/>
+            </a:pPr>
+            <a:r>
+              <a:rPr lang="en-US" dirty="0">
+                <a:latin typeface="Lucida Console"/>
+                <a:cs typeface="Lucida Console"/>
+              </a:rPr>
+              <a:t>COMMENT 'This is the page view table'</a:t>
+            </a:r>
+          </a:p>
+          <a:p>
+            <a:pPr marL="0" indent="0">
+              <a:buNone/>
+            </a:pPr>
+            <a:r>
+              <a:rPr lang="en-US" dirty="0">
+                <a:latin typeface="Lucida Console"/>
+                <a:cs typeface="Lucida Console"/>
+              </a:rPr>
+              <a:t>PARTITIONED BY(</a:t>
+            </a:r>
+            <a:r>
+              <a:rPr lang="en-US" dirty="0" err="1">
+                <a:latin typeface="Lucida Console"/>
+                <a:cs typeface="Lucida Console"/>
+              </a:rPr>
+              <a:t>dt</a:t>
+            </a:r>
+            <a:r>
+              <a:rPr lang="en-US" dirty="0">
+                <a:latin typeface="Lucida Console"/>
+                <a:cs typeface="Lucida Console"/>
+              </a:rPr>
+              <a:t> STRING, country STRING)</a:t>
+            </a:r>
+          </a:p>
+          <a:p>
+            <a:pPr marL="0" indent="0">
+              <a:buNone/>
+            </a:pPr>
+            <a:r>
+              <a:rPr lang="en-US" dirty="0">
+                <a:latin typeface="Lucida Console"/>
+                <a:cs typeface="Lucida Console"/>
+              </a:rPr>
+              <a:t>STORED AS SEQUENCEFILE;</a:t>
+            </a:r>
+          </a:p>
+          <a:p>
+            <a:pPr marL="0" indent="0">
+              <a:buNone/>
+            </a:pPr>
+            <a:endParaRPr lang="en-US" dirty="0">
+              <a:latin typeface="Lucida Console"/>
+              <a:cs typeface="Lucida Console"/>
+            </a:endParaRPr>
+          </a:p>
+          <a:p>
+            <a:pPr marL="0" indent="0">
+              <a:buNone/>
+            </a:pPr>
+            <a:endParaRPr lang="en-US" dirty="0">
+              <a:latin typeface="Lucida Console"/>
+              <a:cs typeface="Lucida Console"/>
+            </a:endParaRPr>
+          </a:p>
+          <a:p>
+            <a:pPr marL="0" indent="0">
+              <a:buNone/>
+            </a:pPr>
+            <a:r>
+              <a:rPr lang="en-US" dirty="0">
+                <a:latin typeface="Lucida Console"/>
+                <a:cs typeface="Lucida Console"/>
+              </a:rPr>
+              <a:t>LOAD DATA LOCAL INPATH /</a:t>
+            </a:r>
+            <a:r>
+              <a:rPr lang="en-US" dirty="0" err="1">
+                <a:latin typeface="Lucida Console"/>
+                <a:cs typeface="Lucida Console"/>
+              </a:rPr>
+              <a:t>tmp</a:t>
+            </a:r>
+            <a:r>
+              <a:rPr lang="en-US" dirty="0">
+                <a:latin typeface="Lucida Console"/>
+                <a:cs typeface="Lucida Console"/>
+              </a:rPr>
+              <a:t>/pv_2008-06-08_us.txt INTO TABLE </a:t>
+            </a:r>
+            <a:r>
+              <a:rPr lang="en-US" dirty="0" err="1">
+                <a:latin typeface="Lucida Console"/>
+                <a:cs typeface="Lucida Console"/>
+              </a:rPr>
+              <a:t>page_view</a:t>
+            </a:r>
+            <a:r>
+              <a:rPr lang="en-US" dirty="0">
+                <a:latin typeface="Lucida Console"/>
+                <a:cs typeface="Lucida Console"/>
+              </a:rPr>
+              <a:t> PARTITION(date='2008-06-08', country='US')</a:t>
+            </a:r>
+          </a:p>
+          <a:p>
+            <a:pPr marL="0" indent="0">
+              <a:buNone/>
+            </a:pPr>
+            <a:endParaRPr lang="en-US" dirty="0">
+              <a:latin typeface="Lucida Console"/>
+              <a:cs typeface="Lucida Console"/>
+            </a:endParaRPr>
+          </a:p>
+          <a:p>
+            <a:pPr marL="0" indent="0">
+              <a:buNone/>
+            </a:pPr>
+            <a:r>
+              <a:rPr lang="en-US" dirty="0">
+                <a:latin typeface="Lucida Console"/>
+                <a:cs typeface="Lucida Console"/>
+              </a:rPr>
+              <a:t>INSERT OVERWRITE TABLE </a:t>
+            </a:r>
+            <a:r>
+              <a:rPr lang="en-US" dirty="0" err="1">
+                <a:latin typeface="Lucida Console"/>
+                <a:cs typeface="Lucida Console"/>
+              </a:rPr>
+              <a:t>xyz_com_page_views</a:t>
+            </a:r>
+            <a:endParaRPr lang="en-US" dirty="0">
+              <a:latin typeface="Lucida Console"/>
+              <a:cs typeface="Lucida Console"/>
+            </a:endParaRPr>
+          </a:p>
+          <a:p>
+            <a:pPr marL="0" indent="0">
+              <a:buNone/>
+            </a:pPr>
+            <a:r>
+              <a:rPr lang="en-US" dirty="0">
+                <a:latin typeface="Lucida Console"/>
+                <a:cs typeface="Lucida Console"/>
+              </a:rPr>
+              <a:t>SELECT </a:t>
+            </a:r>
+            <a:r>
+              <a:rPr lang="en-US" dirty="0" err="1">
+                <a:latin typeface="Lucida Console"/>
+                <a:cs typeface="Lucida Console"/>
+              </a:rPr>
+              <a:t>page_views</a:t>
+            </a:r>
+            <a:r>
+              <a:rPr lang="en-US" dirty="0">
+                <a:latin typeface="Lucida Console"/>
+                <a:cs typeface="Lucida Console"/>
+              </a:rPr>
+              <a:t>.*</a:t>
+            </a:r>
+          </a:p>
+          <a:p>
+            <a:pPr marL="0" indent="0">
+              <a:buNone/>
+            </a:pPr>
+            <a:r>
+              <a:rPr lang="en-US" dirty="0">
+                <a:latin typeface="Lucida Console"/>
+                <a:cs typeface="Lucida Console"/>
+              </a:rPr>
+              <a:t>FROM </a:t>
+            </a:r>
+            <a:r>
+              <a:rPr lang="en-US" dirty="0" err="1">
+                <a:latin typeface="Lucida Console"/>
+                <a:cs typeface="Lucida Console"/>
+              </a:rPr>
+              <a:t>page_views</a:t>
+            </a:r>
+            <a:endParaRPr lang="en-US" dirty="0">
+              <a:latin typeface="Lucida Console"/>
+              <a:cs typeface="Lucida Console"/>
+            </a:endParaRPr>
+          </a:p>
+          <a:p>
+            <a:pPr marL="0" indent="0">
+              <a:buNone/>
+            </a:pPr>
+            <a:r>
+              <a:rPr lang="en-US" dirty="0">
+                <a:latin typeface="Lucida Console"/>
+                <a:cs typeface="Lucida Console"/>
+              </a:rPr>
+              <a:t>WHERE </a:t>
+            </a:r>
+            <a:r>
+              <a:rPr lang="en-US" dirty="0" err="1">
+                <a:latin typeface="Lucida Console"/>
+                <a:cs typeface="Lucida Console"/>
+              </a:rPr>
+              <a:t>page_views.date</a:t>
+            </a:r>
+            <a:r>
+              <a:rPr lang="en-US" dirty="0">
+                <a:latin typeface="Lucida Console"/>
+                <a:cs typeface="Lucida Console"/>
+              </a:rPr>
+              <a:t> &gt;= '2008-03-01' AND </a:t>
+            </a:r>
+            <a:r>
+              <a:rPr lang="en-US" dirty="0" err="1">
+                <a:latin typeface="Lucida Console"/>
+                <a:cs typeface="Lucida Console"/>
+              </a:rPr>
+              <a:t>page_views.date</a:t>
+            </a:r>
+            <a:r>
+              <a:rPr lang="en-US" dirty="0">
+                <a:latin typeface="Lucida Console"/>
+                <a:cs typeface="Lucida Console"/>
+              </a:rPr>
+              <a:t> &lt;= '2008-03-31' AND</a:t>
+            </a:r>
+          </a:p>
+          <a:p>
+            <a:pPr marL="0" indent="0">
+              <a:buNone/>
+            </a:pPr>
+            <a:r>
+              <a:rPr lang="en-US" dirty="0">
+                <a:latin typeface="Lucida Console"/>
+                <a:cs typeface="Lucida Console"/>
+              </a:rPr>
+              <a:t>      </a:t>
+            </a:r>
+            <a:r>
+              <a:rPr lang="en-US" dirty="0" err="1">
+                <a:latin typeface="Lucida Console"/>
+                <a:cs typeface="Lucida Console"/>
+              </a:rPr>
+              <a:t>page_views.referrer_url</a:t>
+            </a:r>
+            <a:r>
+              <a:rPr lang="en-US" dirty="0">
+                <a:latin typeface="Lucida Console"/>
+                <a:cs typeface="Lucida Console"/>
+              </a:rPr>
+              <a:t> like '%</a:t>
+            </a:r>
+            <a:r>
+              <a:rPr lang="en-US" dirty="0" err="1">
+                <a:latin typeface="Lucida Console"/>
+                <a:cs typeface="Lucida Console"/>
+              </a:rPr>
+              <a:t>xyz.com</a:t>
+            </a:r>
+            <a:r>
+              <a:rPr lang="en-US" dirty="0">
+                <a:latin typeface="Lucida Console"/>
+                <a:cs typeface="Lucida Console"/>
+              </a:rPr>
+              <a:t>';</a:t>
             </a:r>
           </a:p>
         </p:txBody>
@@ -6993,7 +7363,7 @@
     </p:spTree>
     <p:extLst>
       <p:ext uri="{BB962C8B-B14F-4D97-AF65-F5344CB8AC3E}">
-        <p14:creationId xmlns:p14="http://schemas.microsoft.com/office/powerpoint/2010/main" val="3825801356"/>
+        <p14:creationId xmlns:p14="http://schemas.microsoft.com/office/powerpoint/2010/main" val="2489775350"/>
       </p:ext>
     </p:extLst>
   </p:cSld>
@@ -7036,6 +7406,135 @@
           <a:lstStyle/>
           <a:p>
             <a:r>
+              <a:rPr lang="en-US" dirty="0" err="1"/>
+              <a:t>SparkSQL</a:t>
+            </a:r>
+            <a:endParaRPr lang="en-US" dirty="0"/>
+          </a:p>
+        </p:txBody>
+      </p:sp>
+      <p:sp>
+        <p:nvSpPr>
+          <p:cNvPr id="3" name="Content Placeholder 2"/>
+          <p:cNvSpPr>
+            <a:spLocks noGrp="1"/>
+          </p:cNvSpPr>
+          <p:nvPr>
+            <p:ph idx="1"/>
+          </p:nvPr>
+        </p:nvSpPr>
+        <p:spPr/>
+        <p:txBody>
+          <a:bodyPr>
+            <a:normAutofit/>
+          </a:bodyPr>
+          <a:lstStyle/>
+          <a:p>
+            <a:r>
+              <a:rPr lang="en-US" dirty="0"/>
+              <a:t>Integrates into existing Spark programs</a:t>
+            </a:r>
+          </a:p>
+          <a:p>
+            <a:pPr lvl="1"/>
+            <a:r>
+              <a:rPr lang="en-US" dirty="0"/>
+              <a:t>Mixes SQL with Python, </a:t>
+            </a:r>
+            <a:r>
+              <a:rPr lang="en-US" dirty="0" err="1"/>
+              <a:t>Scala</a:t>
+            </a:r>
+            <a:r>
+              <a:rPr lang="en-US" dirty="0"/>
+              <a:t> or Java</a:t>
+            </a:r>
+          </a:p>
+          <a:p>
+            <a:r>
+              <a:rPr lang="en-US" dirty="0"/>
+              <a:t>Integrates data from CSV, Avro, Parquet, JDBC, ODBC, JSON, </a:t>
+            </a:r>
+            <a:r>
+              <a:rPr lang="en-US" dirty="0" err="1"/>
+              <a:t>etc</a:t>
+            </a:r>
+            <a:endParaRPr lang="en-US" dirty="0"/>
+          </a:p>
+          <a:p>
+            <a:pPr lvl="1"/>
+            <a:r>
+              <a:rPr lang="en-US" dirty="0"/>
+              <a:t>Including joins across them</a:t>
+            </a:r>
+          </a:p>
+          <a:p>
+            <a:r>
+              <a:rPr lang="en-US" dirty="0"/>
+              <a:t>Fully supports Apache Hive</a:t>
+            </a:r>
+          </a:p>
+          <a:p>
+            <a:pPr lvl="1"/>
+            <a:r>
+              <a:rPr lang="en-US" i="1" dirty="0"/>
+              <a:t>If you build it with Hive support</a:t>
+            </a:r>
+          </a:p>
+          <a:p>
+            <a:r>
+              <a:rPr lang="en-US" dirty="0"/>
+              <a:t>Fits into the resilient scalable model of Spark</a:t>
+            </a:r>
+          </a:p>
+        </p:txBody>
+      </p:sp>
+    </p:spTree>
+    <p:extLst>
+      <p:ext uri="{BB962C8B-B14F-4D97-AF65-F5344CB8AC3E}">
+        <p14:creationId xmlns:p14="http://schemas.microsoft.com/office/powerpoint/2010/main" val="3825801356"/>
+      </p:ext>
+    </p:extLst>
+  </p:cSld>
+  <p:clrMapOvr>
+    <a:masterClrMapping/>
+  </p:clrMapOvr>
+</p:sld>
+</file>
+
+<file path=ppt/slides/slide26.xml><?xml version="1.0" encoding="utf-8"?>
+<p:sld xmlns:a="http://schemas.openxmlformats.org/drawingml/2006/main" xmlns:r="http://schemas.openxmlformats.org/officeDocument/2006/relationships" xmlns:p="http://schemas.openxmlformats.org/presentationml/2006/main">
+  <p:cSld>
+    <p:spTree>
+      <p:nvGrpSpPr>
+        <p:cNvPr id="1" name=""/>
+        <p:cNvGrpSpPr/>
+        <p:nvPr/>
+      </p:nvGrpSpPr>
+      <p:grpSpPr>
+        <a:xfrm>
+          <a:off x="0" y="0"/>
+          <a:ext cx="0" cy="0"/>
+          <a:chOff x="0" y="0"/>
+          <a:chExt cx="0" cy="0"/>
+        </a:xfrm>
+      </p:grpSpPr>
+      <p:sp>
+        <p:nvSpPr>
+          <p:cNvPr id="2" name="Title 1"/>
+          <p:cNvSpPr>
+            <a:spLocks noGrp="1"/>
+          </p:cNvSpPr>
+          <p:nvPr>
+            <p:ph type="title"/>
+          </p:nvPr>
+        </p:nvSpPr>
+        <p:spPr/>
+        <p:txBody>
+          <a:bodyPr/>
+          <a:lstStyle/>
+          <a:p>
+            <a:r>
               <a:rPr lang="en-US" dirty="0"/>
               <a:t>Spark SQL example</a:t>
             </a:r>
@@ -7521,7 +8020,7 @@
 </p:sld>
 </file>
 
-<file path=ppt/slides/slide26.xml><?xml version="1.0" encoding="utf-8"?>
+<file path=ppt/slides/slide27.xml><?xml version="1.0" encoding="utf-8"?>
 <p:sld xmlns:a="http://schemas.openxmlformats.org/drawingml/2006/main" xmlns:r="http://schemas.openxmlformats.org/officeDocument/2006/relationships" xmlns:p="http://schemas.openxmlformats.org/presentationml/2006/main">
   <p:cSld>
     <p:spTree>
@@ -7673,211 +8172,6 @@
 </p:sld>
 </file>
 
-<file path=ppt/slides/slide27.xml><?xml version="1.0" encoding="utf-8"?>
-<p:sld xmlns:a="http://schemas.openxmlformats.org/drawingml/2006/main" xmlns:r="http://schemas.openxmlformats.org/officeDocument/2006/relationships" xmlns:p="http://schemas.openxmlformats.org/presentationml/2006/main">
-  <p:cSld>
-    <p:spTree>
-      <p:nvGrpSpPr>
-        <p:cNvPr id="1" name=""/>
-        <p:cNvGrpSpPr/>
-        <p:nvPr/>
-      </p:nvGrpSpPr>
-      <p:grpSpPr>
-        <a:xfrm>
-          <a:off x="0" y="0"/>
-          <a:ext cx="0" cy="0"/>
-          <a:chOff x="0" y="0"/>
-          <a:chExt cx="0" cy="0"/>
-        </a:xfrm>
-      </p:grpSpPr>
-      <p:sp>
-        <p:nvSpPr>
-          <p:cNvPr id="2" name="Title 1"/>
-          <p:cNvSpPr>
-            <a:spLocks noGrp="1"/>
-          </p:cNvSpPr>
-          <p:nvPr>
-            <p:ph type="title"/>
-          </p:nvPr>
-        </p:nvSpPr>
-        <p:spPr/>
-        <p:txBody>
-          <a:bodyPr/>
-          <a:lstStyle/>
-          <a:p>
-            <a:r>
-              <a:rPr lang="en-US" dirty="0"/>
-              <a:t>More SQL</a:t>
-            </a:r>
-          </a:p>
-        </p:txBody>
-      </p:sp>
-      <p:sp>
-        <p:nvSpPr>
-          <p:cNvPr id="3" name="Content Placeholder 2"/>
-          <p:cNvSpPr>
-            <a:spLocks noGrp="1"/>
-          </p:cNvSpPr>
-          <p:nvPr>
-            <p:ph idx="1"/>
-          </p:nvPr>
-        </p:nvSpPr>
-        <p:spPr/>
-        <p:txBody>
-          <a:bodyPr/>
-          <a:lstStyle/>
-          <a:p>
-            <a:pPr marL="0" indent="0">
-              <a:buNone/>
-            </a:pPr>
-            <a:r>
-              <a:rPr lang="en-US" dirty="0" err="1"/>
-              <a:t>df</a:t>
-            </a:r>
-            <a:r>
-              <a:rPr lang="en-US" dirty="0"/>
-              <a:t>.</a:t>
-            </a:r>
-            <a:br>
-              <a:rPr lang="en-US" dirty="0"/>
-            </a:br>
-            <a:r>
-              <a:rPr lang="en-US" dirty="0"/>
-              <a:t>  select('</a:t>
-            </a:r>
-            <a:r>
-              <a:rPr lang="en-US" dirty="0" err="1"/>
-              <a:t>postcode’,’id</a:t>
-            </a:r>
-            <a:r>
-              <a:rPr lang="en-US" dirty="0"/>
-              <a:t>').</a:t>
-            </a:r>
-            <a:br>
-              <a:rPr lang="en-US" dirty="0"/>
-            </a:br>
-            <a:r>
-              <a:rPr lang="en-US" dirty="0"/>
-              <a:t>  </a:t>
-            </a:r>
-            <a:r>
-              <a:rPr lang="en-US" dirty="0" err="1"/>
-              <a:t>withColumn</a:t>
-            </a:r>
-            <a:r>
-              <a:rPr lang="en-US" dirty="0"/>
-              <a:t>('</a:t>
-            </a:r>
-            <a:r>
-              <a:rPr lang="en-US" dirty="0" err="1"/>
-              <a:t>first_pc</a:t>
-            </a:r>
-            <a:r>
-              <a:rPr lang="en-US" dirty="0"/>
-              <a:t>', </a:t>
-            </a:r>
-            <a:br>
-              <a:rPr lang="en-US" dirty="0"/>
-            </a:br>
-            <a:r>
-              <a:rPr lang="en-US" dirty="0"/>
-              <a:t>    split(</a:t>
-            </a:r>
-            <a:r>
-              <a:rPr lang="en-US" dirty="0" err="1"/>
-              <a:t>df.postcode</a:t>
-            </a:r>
-            <a:r>
-              <a:rPr lang="en-US" dirty="0"/>
-              <a:t>, ‘\s’[0]).</a:t>
-            </a:r>
-            <a:br>
-              <a:rPr lang="en-US" dirty="0"/>
-            </a:br>
-            <a:r>
-              <a:rPr lang="en-US" dirty="0"/>
-              <a:t>    where((col("</a:t>
-            </a:r>
-            <a:r>
-              <a:rPr lang="en-US" dirty="0" err="1"/>
-              <a:t>first_pc</a:t>
-            </a:r>
-            <a:r>
-              <a:rPr lang="en-US" dirty="0"/>
-              <a:t>") == 'SW11') or  </a:t>
-            </a:r>
-            <a:br>
-              <a:rPr lang="en-US" dirty="0"/>
-            </a:br>
-            <a:r>
-              <a:rPr lang="en-US" dirty="0"/>
-              <a:t>                 (col("</a:t>
-            </a:r>
-            <a:r>
-              <a:rPr lang="en-US" dirty="0" err="1"/>
-              <a:t>first_pc</a:t>
-            </a:r>
-            <a:r>
-              <a:rPr lang="en-US" dirty="0"/>
-              <a:t>") == 'OX1')).</a:t>
-            </a:r>
-            <a:br>
-              <a:rPr lang="en-US" dirty="0"/>
-            </a:br>
-            <a:r>
-              <a:rPr lang="en-US" dirty="0"/>
-              <a:t>     </a:t>
-            </a:r>
-            <a:r>
-              <a:rPr lang="en-US" dirty="0" err="1"/>
-              <a:t>groupBy</a:t>
-            </a:r>
-            <a:r>
-              <a:rPr lang="en-US" dirty="0"/>
-              <a:t>('</a:t>
-            </a:r>
-            <a:r>
-              <a:rPr lang="en-US" dirty="0" err="1"/>
-              <a:t>first_pc</a:t>
-            </a:r>
-            <a:r>
-              <a:rPr lang="en-US" dirty="0"/>
-              <a:t>').</a:t>
-            </a:r>
-            <a:br>
-              <a:rPr lang="en-US" dirty="0"/>
-            </a:br>
-            <a:r>
-              <a:rPr lang="en-US" dirty="0"/>
-              <a:t>     </a:t>
-            </a:r>
-            <a:r>
-              <a:rPr lang="en-US" dirty="0" err="1"/>
-              <a:t>agg</a:t>
-            </a:r>
-            <a:r>
-              <a:rPr lang="en-US" dirty="0"/>
-              <a:t>({"id": "count"}).show()</a:t>
-            </a:r>
-          </a:p>
-          <a:p>
-            <a:endParaRPr lang="en-US" dirty="0"/>
-          </a:p>
-        </p:txBody>
-      </p:sp>
-    </p:spTree>
-    <p:extLst>
-      <p:ext uri="{BB962C8B-B14F-4D97-AF65-F5344CB8AC3E}">
-        <p14:creationId xmlns:p14="http://schemas.microsoft.com/office/powerpoint/2010/main" val="2781459140"/>
-      </p:ext>
-    </p:extLst>
-  </p:cSld>
-  <p:clrMapOvr>
-    <a:masterClrMapping/>
-  </p:clrMapOvr>
-</p:sld>
-</file>
-
 <file path=ppt/slides/slide28.xml><?xml version="1.0" encoding="utf-8"?>
 <p:sld xmlns:a="http://schemas.openxmlformats.org/drawingml/2006/main" xmlns:r="http://schemas.openxmlformats.org/officeDocument/2006/relationships" xmlns:p="http://schemas.openxmlformats.org/presentationml/2006/main">
   <p:cSld>
@@ -7912,7 +8206,7 @@
           <a:p>
             <a:r>
               <a:rPr lang="en-US" dirty="0"/>
-              <a:t>User Defined Functions</a:t>
+              <a:t>More SQL</a:t>
             </a:r>
           </a:p>
         </p:txBody>
@@ -7929,115 +8223,151 @@
         </p:nvSpPr>
         <p:spPr/>
         <p:txBody>
-          <a:bodyPr>
-            <a:normAutofit/>
-          </a:bodyPr>
+          <a:bodyPr/>
           <a:lstStyle/>
           <a:p>
-            <a:r>
-              <a:rPr lang="en-US" dirty="0"/>
-              <a:t>In SQL a User Defined Function is an extension that helps perform other functions in SQL</a:t>
-            </a:r>
-          </a:p>
-          <a:p>
-            <a:r>
-              <a:rPr lang="en-US" dirty="0"/>
-              <a:t>In Spark we can add our own functions (e.g. written in Python)</a:t>
-            </a:r>
-          </a:p>
-          <a:p>
             <a:pPr marL="0" indent="0">
               <a:buNone/>
             </a:pPr>
             <a:r>
-              <a:rPr lang="en-US" sz="2000" dirty="0" err="1">
-                <a:latin typeface="Menlo Regular"/>
-                <a:cs typeface="Menlo Regular"/>
-              </a:rPr>
-              <a:t>def</a:t>
-            </a:r>
-            <a:r>
-              <a:rPr lang="en-US" sz="2000" dirty="0">
-                <a:latin typeface="Menlo Regular"/>
-                <a:cs typeface="Menlo Regular"/>
-              </a:rPr>
-              <a:t> squared(s):</a:t>
-            </a:r>
-          </a:p>
-          <a:p>
-            <a:pPr marL="0" indent="0">
-              <a:buNone/>
-            </a:pPr>
-            <a:r>
-              <a:rPr lang="en-US" sz="2000" dirty="0">
-                <a:latin typeface="Menlo Regular"/>
-                <a:cs typeface="Menlo Regular"/>
-              </a:rPr>
-              <a:t>  return s * s</a:t>
-            </a:r>
-          </a:p>
-          <a:p>
-            <a:pPr marL="0" indent="0">
-              <a:buNone/>
-            </a:pPr>
-            <a:r>
-              <a:rPr lang="en-US" sz="2000" dirty="0" err="1">
-                <a:latin typeface="Menlo Regular"/>
-                <a:cs typeface="Menlo Regular"/>
-              </a:rPr>
-              <a:t>sqlContext.udf.register</a:t>
-            </a:r>
-            <a:r>
-              <a:rPr lang="en-US" sz="2000" dirty="0">
-                <a:latin typeface="Menlo Regular"/>
-                <a:cs typeface="Menlo Regular"/>
-              </a:rPr>
-              <a:t>("squared", squared)</a:t>
+              <a:rPr lang="en-US" dirty="0" err="1"/>
+              <a:t>df</a:t>
+            </a:r>
+            <a:r>
+              <a:rPr lang="en-US" dirty="0"/>
+              <a:t>.</a:t>
             </a:r>
             <a:br>
-              <a:rPr lang="en-US" sz="2000" dirty="0">
-                <a:latin typeface="Menlo Regular"/>
-                <a:cs typeface="Menlo Regular"/>
-              </a:rPr>
+              <a:rPr lang="en-US" dirty="0"/>
             </a:br>
+            <a:r>
+              <a:rPr lang="en-US" dirty="0"/>
+              <a:t>  select('</a:t>
+            </a:r>
+            <a:r>
+              <a:rPr lang="en-US" dirty="0" err="1"/>
+              <a:t>postcode’,’id</a:t>
+            </a:r>
+            <a:r>
+              <a:rPr lang="en-US" dirty="0"/>
+              <a:t>').</a:t>
+            </a:r>
             <a:br>
-              <a:rPr lang="en-US" sz="2000" dirty="0">
-                <a:latin typeface="Menlo Regular"/>
-                <a:cs typeface="Menlo Regular"/>
-              </a:rPr>
+              <a:rPr lang="en-US" dirty="0"/>
             </a:br>
             <a:r>
-              <a:rPr lang="en-US" sz="2000" dirty="0">
-                <a:latin typeface="Menlo Regular"/>
-                <a:cs typeface="Menlo Regular"/>
-              </a:rPr>
-              <a:t>SELECT squared(age) as </a:t>
-            </a:r>
-            <a:r>
-              <a:rPr lang="en-US" sz="2000" dirty="0" err="1">
-                <a:latin typeface="Menlo Regular"/>
-                <a:cs typeface="Menlo Regular"/>
-              </a:rPr>
-              <a:t>agesquared</a:t>
-            </a:r>
-            <a:r>
-              <a:rPr lang="en-US" sz="2000">
-                <a:latin typeface="Menlo Regular"/>
-                <a:cs typeface="Menlo Regular"/>
-              </a:rPr>
-              <a:t> from PERSON</a:t>
-            </a:r>
-            <a:endParaRPr lang="en-US" sz="2000" dirty="0">
-              <a:latin typeface="Menlo Regular"/>
-              <a:cs typeface="Menlo Regular"/>
-            </a:endParaRPr>
+              <a:rPr lang="en-US" dirty="0"/>
+              <a:t>  </a:t>
+            </a:r>
+            <a:r>
+              <a:rPr lang="en-US" dirty="0" err="1"/>
+              <a:t>withColumn</a:t>
+            </a:r>
+            <a:r>
+              <a:rPr lang="en-US" dirty="0"/>
+              <a:t>('</a:t>
+            </a:r>
+            <a:r>
+              <a:rPr lang="en-US" dirty="0" err="1"/>
+              <a:t>first_pc</a:t>
+            </a:r>
+            <a:r>
+              <a:rPr lang="en-US" dirty="0"/>
+              <a:t>', </a:t>
+            </a:r>
+            <a:br>
+              <a:rPr lang="en-US" dirty="0"/>
+            </a:br>
+            <a:r>
+              <a:rPr lang="en-US" dirty="0"/>
+              <a:t>    split(</a:t>
+            </a:r>
+            <a:r>
+              <a:rPr lang="en-US" dirty="0" err="1"/>
+              <a:t>df.postcode</a:t>
+            </a:r>
+            <a:r>
+              <a:rPr lang="en-US" dirty="0"/>
+              <a:t>, ‘\s’[0]).</a:t>
+            </a:r>
+            <a:br>
+              <a:rPr lang="en-US" dirty="0"/>
+            </a:br>
+            <a:r>
+              <a:rPr lang="en-US" dirty="0"/>
+              <a:t>    where((col("</a:t>
+            </a:r>
+            <a:r>
+              <a:rPr lang="en-US" dirty="0" err="1"/>
+              <a:t>first_pc</a:t>
+            </a:r>
+            <a:r>
+              <a:rPr lang="en-US" dirty="0"/>
+              <a:t>") == 'SW11') or  </a:t>
+            </a:r>
+            <a:br>
+              <a:rPr lang="en-US" dirty="0"/>
+            </a:br>
+            <a:r>
+              <a:rPr lang="en-US" dirty="0"/>
+              <a:t>                 (col("</a:t>
+            </a:r>
+            <a:r>
+              <a:rPr lang="en-US" dirty="0" err="1"/>
+              <a:t>first_pc</a:t>
+            </a:r>
+            <a:r>
+              <a:rPr lang="en-US" dirty="0"/>
+              <a:t>") == 'OX1')).</a:t>
+            </a:r>
+            <a:br>
+              <a:rPr lang="en-US" dirty="0"/>
+            </a:br>
+            <a:r>
+              <a:rPr lang="en-US" dirty="0"/>
+              <a:t>     </a:t>
+            </a:r>
+            <a:r>
+              <a:rPr lang="en-US" dirty="0" err="1"/>
+              <a:t>groupBy</a:t>
+            </a:r>
+            <a:r>
+              <a:rPr lang="en-US" dirty="0"/>
+              <a:t>('</a:t>
+            </a:r>
+            <a:r>
+              <a:rPr lang="en-US" dirty="0" err="1"/>
+              <a:t>first_pc</a:t>
+            </a:r>
+            <a:r>
+              <a:rPr lang="en-US" dirty="0"/>
+              <a:t>').</a:t>
+            </a:r>
+            <a:br>
+              <a:rPr lang="en-US" dirty="0"/>
+            </a:br>
+            <a:r>
+              <a:rPr lang="en-US" dirty="0"/>
+              <a:t>     </a:t>
+            </a:r>
+            <a:r>
+              <a:rPr lang="en-US" dirty="0" err="1"/>
+              <a:t>agg</a:t>
+            </a:r>
+            <a:r>
+              <a:rPr lang="en-US" dirty="0"/>
+              <a:t>({"id": "count"}).show()</a:t>
+            </a:r>
+          </a:p>
+          <a:p>
+            <a:endParaRPr lang="en-US" dirty="0"/>
           </a:p>
         </p:txBody>
       </p:sp>
     </p:spTree>
     <p:extLst>
       <p:ext uri="{BB962C8B-B14F-4D97-AF65-F5344CB8AC3E}">
-        <p14:creationId xmlns:p14="http://schemas.microsoft.com/office/powerpoint/2010/main" val="239102712"/>
+        <p14:creationId xmlns:p14="http://schemas.microsoft.com/office/powerpoint/2010/main" val="2781459140"/>
       </p:ext>
     </p:extLst>
   </p:cSld>
@@ -8081,15 +8411,132 @@
           <a:p>
             <a:r>
               <a:rPr lang="en-US" dirty="0"/>
-              <a:t>Questions?</a:t>
-            </a:r>
+              <a:t>User Defined Functions</a:t>
+            </a:r>
+          </a:p>
+        </p:txBody>
+      </p:sp>
+      <p:sp>
+        <p:nvSpPr>
+          <p:cNvPr id="3" name="Content Placeholder 2"/>
+          <p:cNvSpPr>
+            <a:spLocks noGrp="1"/>
+          </p:cNvSpPr>
+          <p:nvPr>
+            <p:ph idx="1"/>
+          </p:nvPr>
+        </p:nvSpPr>
+        <p:spPr/>
+        <p:txBody>
+          <a:bodyPr>
+            <a:normAutofit/>
+          </a:bodyPr>
+          <a:lstStyle/>
+          <a:p>
+            <a:r>
+              <a:rPr lang="en-US" dirty="0"/>
+              <a:t>In SQL a User Defined Function is an extension that helps perform other functions in SQL</a:t>
+            </a:r>
+          </a:p>
+          <a:p>
+            <a:r>
+              <a:rPr lang="en-US" dirty="0"/>
+              <a:t>In Spark we can add our own functions (e.g. written in Python)</a:t>
+            </a:r>
+          </a:p>
+          <a:p>
+            <a:pPr marL="0" indent="0">
+              <a:buNone/>
+            </a:pPr>
+            <a:r>
+              <a:rPr lang="en-US" sz="2000" dirty="0" err="1">
+                <a:latin typeface="Menlo Regular"/>
+                <a:cs typeface="Menlo Regular"/>
+              </a:rPr>
+              <a:t>def</a:t>
+            </a:r>
+            <a:r>
+              <a:rPr lang="en-US" sz="2000" dirty="0">
+                <a:latin typeface="Menlo Regular"/>
+                <a:cs typeface="Menlo Regular"/>
+              </a:rPr>
+              <a:t> squared(s):</a:t>
+            </a:r>
+          </a:p>
+          <a:p>
+            <a:pPr marL="0" indent="0">
+              <a:buNone/>
+            </a:pPr>
+            <a:r>
+              <a:rPr lang="en-US" sz="2000" dirty="0">
+                <a:latin typeface="Menlo Regular"/>
+                <a:cs typeface="Menlo Regular"/>
+              </a:rPr>
+              <a:t>  return s * s</a:t>
+            </a:r>
+          </a:p>
+          <a:p>
+            <a:pPr marL="0" indent="0">
+              <a:buNone/>
+            </a:pPr>
+            <a:r>
+              <a:rPr lang="en-US" sz="2000" dirty="0" err="1">
+                <a:latin typeface="Menlo Regular"/>
+                <a:cs typeface="Menlo Regular"/>
+              </a:rPr>
+              <a:t>sqlContext.udf.register</a:t>
+            </a:r>
+            <a:r>
+              <a:rPr lang="en-US" sz="2000" dirty="0">
+                <a:latin typeface="Menlo Regular"/>
+                <a:cs typeface="Menlo Regular"/>
+              </a:rPr>
+              <a:t>("squared", squared)</a:t>
+            </a:r>
+            <a:br>
+              <a:rPr lang="en-US" sz="2000" dirty="0">
+                <a:latin typeface="Menlo Regular"/>
+                <a:cs typeface="Menlo Regular"/>
+              </a:rPr>
+            </a:br>
+            <a:br>
+              <a:rPr lang="en-US" sz="2000" dirty="0">
+                <a:latin typeface="Menlo Regular"/>
+                <a:cs typeface="Menlo Regular"/>
+              </a:rPr>
+            </a:br>
+            <a:r>
+              <a:rPr lang="en-US" sz="2000" dirty="0">
+                <a:latin typeface="Menlo Regular"/>
+                <a:cs typeface="Menlo Regular"/>
+              </a:rPr>
+              <a:t>SELECT squared(age) as </a:t>
+            </a:r>
+            <a:r>
+              <a:rPr lang="en-US" sz="2000" dirty="0" err="1">
+                <a:latin typeface="Menlo Regular"/>
+                <a:cs typeface="Menlo Regular"/>
+              </a:rPr>
+              <a:t>agesquared</a:t>
+            </a:r>
+            <a:r>
+              <a:rPr lang="en-US" sz="2000">
+                <a:latin typeface="Menlo Regular"/>
+                <a:cs typeface="Menlo Regular"/>
+              </a:rPr>
+              <a:t> from PERSON</a:t>
+            </a:r>
+            <a:endParaRPr lang="en-US" sz="2000" dirty="0">
+              <a:latin typeface="Menlo Regular"/>
+              <a:cs typeface="Menlo Regular"/>
+            </a:endParaRPr>
           </a:p>
         </p:txBody>
       </p:sp>
     </p:spTree>
     <p:extLst>
       <p:ext uri="{BB962C8B-B14F-4D97-AF65-F5344CB8AC3E}">
-        <p14:creationId xmlns:p14="http://schemas.microsoft.com/office/powerpoint/2010/main" val="2250615443"/>
+        <p14:creationId xmlns:p14="http://schemas.microsoft.com/office/powerpoint/2010/main" val="239102712"/>
       </p:ext>
     </p:extLst>
   </p:cSld>
@@ -8228,6 +8675,58 @@
     <p:extLst>
       <p:ext uri="{BB962C8B-B14F-4D97-AF65-F5344CB8AC3E}">
         <p14:creationId xmlns:p14="http://schemas.microsoft.com/office/powerpoint/2010/main" val="2605565154"/>
+      </p:ext>
+    </p:extLst>
+  </p:cSld>
+  <p:clrMapOvr>
+    <a:masterClrMapping/>
+  </p:clrMapOvr>
+</p:sld>
+</file>
+
+<file path=ppt/slides/slide30.xml><?xml version="1.0" encoding="utf-8"?>
+<p:sld xmlns:a="http://schemas.openxmlformats.org/drawingml/2006/main" xmlns:r="http://schemas.openxmlformats.org/officeDocument/2006/relationships" xmlns:p="http://schemas.openxmlformats.org/presentationml/2006/main">
+  <p:cSld>
+    <p:spTree>
+      <p:nvGrpSpPr>
+        <p:cNvPr id="1" name=""/>
+        <p:cNvGrpSpPr/>
+        <p:nvPr/>
+      </p:nvGrpSpPr>
+      <p:grpSpPr>
+        <a:xfrm>
+          <a:off x="0" y="0"/>
+          <a:ext cx="0" cy="0"/>
+          <a:chOff x="0" y="0"/>
+          <a:chExt cx="0" cy="0"/>
+        </a:xfrm>
+      </p:grpSpPr>
+      <p:sp>
+        <p:nvSpPr>
+          <p:cNvPr id="2" name="Title 1"/>
+          <p:cNvSpPr>
+            <a:spLocks noGrp="1"/>
+          </p:cNvSpPr>
+          <p:nvPr>
+            <p:ph type="title"/>
+          </p:nvPr>
+        </p:nvSpPr>
+        <p:spPr/>
+        <p:txBody>
+          <a:bodyPr/>
+          <a:lstStyle/>
+          <a:p>
+            <a:r>
+              <a:rPr lang="en-US" dirty="0"/>
+              <a:t>Questions?</a:t>
+            </a:r>
+          </a:p>
+        </p:txBody>
+      </p:sp>
+    </p:spTree>
+    <p:extLst>
+      <p:ext uri="{BB962C8B-B14F-4D97-AF65-F5344CB8AC3E}">
+        <p14:creationId xmlns:p14="http://schemas.microsoft.com/office/powerpoint/2010/main" val="2250615443"/>
       </p:ext>
     </p:extLst>
   </p:cSld>
@@ -8399,13 +8898,29 @@
           <a:p>
             <a:r>
               <a:rPr lang="en-US" dirty="0"/>
-              <a:t>A primary key for each row uniquely identifies it</a:t>
-            </a:r>
-          </a:p>
-          <a:p>
-            <a:r>
-              <a:rPr lang="en-US" dirty="0"/>
-              <a:t>A foreign key points to another table’s primary key</a:t>
+              <a:t>A </a:t>
+            </a:r>
+            <a:r>
+              <a:rPr lang="en-US" b="1" dirty="0"/>
+              <a:t>primary key </a:t>
+            </a:r>
+            <a:r>
+              <a:rPr lang="en-US" dirty="0"/>
+              <a:t>for each row uniquely identifies it</a:t>
+            </a:r>
+          </a:p>
+          <a:p>
+            <a:r>
+              <a:rPr lang="en-US" dirty="0"/>
+              <a:t>A </a:t>
+            </a:r>
+            <a:r>
+              <a:rPr lang="en-US" b="1" dirty="0"/>
+              <a:t>foreign key</a:t>
+            </a:r>
+            <a:r>
+              <a:rPr lang="en-US" dirty="0"/>
+              <a:t> points to another table’s primary key</a:t>
             </a:r>
           </a:p>
         </p:txBody>
@@ -9042,6 +9557,31 @@
           </a:p>
         </p:txBody>
       </p:sp>
+      <p:sp>
+        <p:nvSpPr>
+          <p:cNvPr id="20" name="Content Placeholder 19">
+            <a:extLst>
+              <a:ext uri="{FF2B5EF4-FFF2-40B4-BE49-F238E27FC236}">
+                <a16:creationId xmlns:a16="http://schemas.microsoft.com/office/drawing/2014/main" id="{C59C86C0-C1EE-DA4F-BAD6-3DF6482D78E4}"/>
+              </a:ext>
+            </a:extLst>
+          </p:cNvPr>
+          <p:cNvSpPr>
+            <a:spLocks noGrp="1"/>
+          </p:cNvSpPr>
+          <p:nvPr>
+            <p:ph idx="1"/>
+          </p:nvPr>
+        </p:nvSpPr>
+        <p:spPr/>
+        <p:txBody>
+          <a:bodyPr/>
+          <a:lstStyle/>
+          <a:p>
+            <a:endParaRPr lang="en-US"/>
+          </a:p>
+        </p:txBody>
+      </p:sp>
       <p:pic>
         <p:nvPicPr>
           <p:cNvPr id="5" name="Picture 4"/>
@@ -9064,8 +9604,267 @@
           <a:prstGeom prst="rect">
             <a:avLst/>
           </a:prstGeom>
+          <a:ln>
+            <a:solidFill>
+              <a:schemeClr val="bg1">
+                <a:lumMod val="65000"/>
+              </a:schemeClr>
+            </a:solidFill>
+          </a:ln>
         </p:spPr>
       </p:pic>
+      <p:sp>
+        <p:nvSpPr>
+          <p:cNvPr id="3" name="TextBox 2">
+            <a:extLst>
+              <a:ext uri="{FF2B5EF4-FFF2-40B4-BE49-F238E27FC236}">
+                <a16:creationId xmlns:a16="http://schemas.microsoft.com/office/drawing/2014/main" id="{FA38F18C-13F7-1F4D-BAEF-A44D07DA0612}"/>
+              </a:ext>
+            </a:extLst>
+          </p:cNvPr>
+          <p:cNvSpPr txBox="1"/>
+          <p:nvPr/>
+        </p:nvSpPr>
+        <p:spPr>
+          <a:xfrm>
+            <a:off x="3139440" y="6214030"/>
+            <a:ext cx="518160" cy="307777"/>
+          </a:xfrm>
+          <a:prstGeom prst="rect">
+            <a:avLst/>
+          </a:prstGeom>
+          <a:noFill/>
+        </p:spPr>
+        <p:txBody>
+          <a:bodyPr wrap="square" rtlCol="0">
+            <a:spAutoFit/>
+          </a:bodyPr>
+          <a:lstStyle/>
+          <a:p>
+            <a:r>
+              <a:rPr lang="en-US" sz="1400" dirty="0"/>
+              <a:t>FK</a:t>
+            </a:r>
+          </a:p>
+        </p:txBody>
+      </p:sp>
+      <p:sp>
+        <p:nvSpPr>
+          <p:cNvPr id="4" name="TextBox 3">
+            <a:extLst>
+              <a:ext uri="{FF2B5EF4-FFF2-40B4-BE49-F238E27FC236}">
+                <a16:creationId xmlns:a16="http://schemas.microsoft.com/office/drawing/2014/main" id="{3C06A089-23DE-5446-A5D0-044988967290}"/>
+              </a:ext>
+            </a:extLst>
+          </p:cNvPr>
+          <p:cNvSpPr txBox="1"/>
+          <p:nvPr/>
+        </p:nvSpPr>
+        <p:spPr>
+          <a:xfrm>
+            <a:off x="2979420" y="5882641"/>
+            <a:ext cx="678180" cy="307777"/>
+          </a:xfrm>
+          <a:prstGeom prst="rect">
+            <a:avLst/>
+          </a:prstGeom>
+          <a:solidFill>
+            <a:schemeClr val="bg1"/>
+          </a:solidFill>
+        </p:spPr>
+        <p:txBody>
+          <a:bodyPr wrap="square" rtlCol="0">
+            <a:spAutoFit/>
+          </a:bodyPr>
+          <a:lstStyle/>
+          <a:p>
+            <a:r>
+              <a:rPr lang="en-US" sz="1400" dirty="0"/>
+              <a:t>PK, FK</a:t>
+            </a:r>
+          </a:p>
+        </p:txBody>
+      </p:sp>
+      <p:cxnSp>
+        <p:nvCxnSpPr>
+          <p:cNvPr id="7" name="Straight Connector 6">
+            <a:extLst>
+              <a:ext uri="{FF2B5EF4-FFF2-40B4-BE49-F238E27FC236}">
+                <a16:creationId xmlns:a16="http://schemas.microsoft.com/office/drawing/2014/main" id="{A79E750D-0DF8-B041-B6C1-23D90A52BC31}"/>
+              </a:ext>
+            </a:extLst>
+          </p:cNvPr>
+          <p:cNvCxnSpPr>
+            <a:cxnSpLocks/>
+          </p:cNvCxnSpPr>
+          <p:nvPr/>
+        </p:nvCxnSpPr>
+        <p:spPr>
+          <a:xfrm flipH="1">
+            <a:off x="2407920" y="6521807"/>
+            <a:ext cx="571500" cy="0"/>
+          </a:xfrm>
+          <a:prstGeom prst="line">
+            <a:avLst/>
+          </a:prstGeom>
+          <a:ln w="22225">
+            <a:solidFill>
+              <a:schemeClr val="bg1">
+                <a:lumMod val="75000"/>
+              </a:schemeClr>
+            </a:solidFill>
+          </a:ln>
+        </p:spPr>
+        <p:style>
+          <a:lnRef idx="2">
+            <a:schemeClr val="accent1"/>
+          </a:lnRef>
+          <a:fillRef idx="0">
+            <a:schemeClr val="accent1"/>
+          </a:fillRef>
+          <a:effectRef idx="1">
+            <a:schemeClr val="accent1"/>
+          </a:effectRef>
+          <a:fontRef idx="minor">
+            <a:schemeClr val="tx1"/>
+          </a:fontRef>
+        </p:style>
+      </p:cxnSp>
+      <p:cxnSp>
+        <p:nvCxnSpPr>
+          <p:cNvPr id="10" name="Straight Connector 9">
+            <a:extLst>
+              <a:ext uri="{FF2B5EF4-FFF2-40B4-BE49-F238E27FC236}">
+                <a16:creationId xmlns:a16="http://schemas.microsoft.com/office/drawing/2014/main" id="{BBED4E7E-E409-5042-AB90-78377BA7AE2F}"/>
+              </a:ext>
+            </a:extLst>
+          </p:cNvPr>
+          <p:cNvCxnSpPr>
+            <a:cxnSpLocks/>
+          </p:cNvCxnSpPr>
+          <p:nvPr/>
+        </p:nvCxnSpPr>
+        <p:spPr>
+          <a:xfrm flipV="1">
+            <a:off x="2407920" y="6018887"/>
+            <a:ext cx="0" cy="502920"/>
+          </a:xfrm>
+          <a:prstGeom prst="line">
+            <a:avLst/>
+          </a:prstGeom>
+          <a:ln w="22225">
+            <a:solidFill>
+              <a:schemeClr val="bg1">
+                <a:lumMod val="75000"/>
+              </a:schemeClr>
+            </a:solidFill>
+          </a:ln>
+        </p:spPr>
+        <p:style>
+          <a:lnRef idx="2">
+            <a:schemeClr val="accent1"/>
+          </a:lnRef>
+          <a:fillRef idx="0">
+            <a:schemeClr val="accent1"/>
+          </a:fillRef>
+          <a:effectRef idx="1">
+            <a:schemeClr val="accent1"/>
+          </a:effectRef>
+          <a:fontRef idx="minor">
+            <a:schemeClr val="tx1"/>
+          </a:fontRef>
+        </p:style>
+      </p:cxnSp>
+      <p:cxnSp>
+        <p:nvCxnSpPr>
+          <p:cNvPr id="13" name="Straight Connector 12">
+            <a:extLst>
+              <a:ext uri="{FF2B5EF4-FFF2-40B4-BE49-F238E27FC236}">
+                <a16:creationId xmlns:a16="http://schemas.microsoft.com/office/drawing/2014/main" id="{2FCA5926-56C9-1344-9DD3-2D3A96610625}"/>
+              </a:ext>
+            </a:extLst>
+          </p:cNvPr>
+          <p:cNvCxnSpPr>
+            <a:cxnSpLocks/>
+          </p:cNvCxnSpPr>
+          <p:nvPr/>
+        </p:nvCxnSpPr>
+        <p:spPr>
+          <a:xfrm flipV="1">
+            <a:off x="2686050" y="6408251"/>
+            <a:ext cx="0" cy="227111"/>
+          </a:xfrm>
+          <a:prstGeom prst="line">
+            <a:avLst/>
+          </a:prstGeom>
+          <a:ln w="22225">
+            <a:solidFill>
+              <a:schemeClr val="bg1">
+                <a:lumMod val="75000"/>
+              </a:schemeClr>
+            </a:solidFill>
+          </a:ln>
+        </p:spPr>
+        <p:style>
+          <a:lnRef idx="2">
+            <a:schemeClr val="accent1"/>
+          </a:lnRef>
+          <a:fillRef idx="0">
+            <a:schemeClr val="accent1"/>
+          </a:fillRef>
+          <a:effectRef idx="1">
+            <a:schemeClr val="accent1"/>
+          </a:effectRef>
+          <a:fontRef idx="minor">
+            <a:schemeClr val="tx1"/>
+          </a:fontRef>
+        </p:style>
+      </p:cxnSp>
+      <p:cxnSp>
+        <p:nvCxnSpPr>
+          <p:cNvPr id="16" name="Straight Connector 15">
+            <a:extLst>
+              <a:ext uri="{FF2B5EF4-FFF2-40B4-BE49-F238E27FC236}">
+                <a16:creationId xmlns:a16="http://schemas.microsoft.com/office/drawing/2014/main" id="{7F239658-8F40-374B-A746-407641B9D186}"/>
+              </a:ext>
+            </a:extLst>
+          </p:cNvPr>
+          <p:cNvCxnSpPr>
+            <a:cxnSpLocks/>
+          </p:cNvCxnSpPr>
+          <p:nvPr/>
+        </p:nvCxnSpPr>
+        <p:spPr>
+          <a:xfrm flipV="1">
+            <a:off x="2815590" y="6408250"/>
+            <a:ext cx="0" cy="227111"/>
+          </a:xfrm>
+          <a:prstGeom prst="line">
+            <a:avLst/>
+          </a:prstGeom>
+          <a:ln w="22225">
+            <a:solidFill>
+              <a:schemeClr val="bg1">
+                <a:lumMod val="75000"/>
+              </a:schemeClr>
+            </a:solidFill>
+          </a:ln>
+        </p:spPr>
+        <p:style>
+          <a:lnRef idx="2">
+            <a:schemeClr val="accent1"/>
+          </a:lnRef>
+          <a:fillRef idx="0">
+            <a:schemeClr val="accent1"/>
+          </a:fillRef>
+          <a:effectRef idx="1">
+            <a:schemeClr val="accent1"/>
+          </a:effectRef>
+          <a:fontRef idx="minor">
+            <a:schemeClr val="tx1"/>
+          </a:fontRef>
+        </p:style>
+      </p:cxnSp>
     </p:spTree>
     <p:extLst>
       <p:ext uri="{BB962C8B-B14F-4D97-AF65-F5344CB8AC3E}">
@@ -9139,8 +9938,8 @@
         </p:nvSpPr>
         <p:spPr/>
         <p:txBody>
-          <a:bodyPr>
-            <a:normAutofit fontScale="70000" lnSpcReduction="20000"/>
+          <a:bodyPr numCol="2">
+            <a:normAutofit lnSpcReduction="10000"/>
           </a:bodyPr>
           <a:lstStyle/>
           <a:p>
@@ -9148,8 +9947,16 @@
               <a:buNone/>
             </a:pPr>
             <a:r>
-              <a:rPr lang="en-US" dirty="0"/>
-              <a:t>CREATE TABLE `PERSON` (</a:t>
+              <a:rPr lang="en-US" sz="2600" dirty="0">
+                <a:solidFill>
+                  <a:schemeClr val="accent1"/>
+                </a:solidFill>
+              </a:rPr>
+              <a:t>CREATE TABLE </a:t>
+            </a:r>
+            <a:r>
+              <a:rPr lang="en-US" sz="2600" dirty="0"/>
+              <a:t>Person (</a:t>
             </a:r>
           </a:p>
           <a:p>
@@ -9157,8 +9964,8 @@
               <a:buNone/>
             </a:pPr>
             <a:r>
-              <a:rPr lang="en-US" dirty="0"/>
-              <a:t>  `id` INT,</a:t>
+              <a:rPr lang="en-US" sz="2600" dirty="0"/>
+              <a:t>  id INT,</a:t>
             </a:r>
           </a:p>
           <a:p>
@@ -9166,16 +9973,16 @@
               <a:buNone/>
             </a:pPr>
             <a:r>
-              <a:rPr lang="en-US" dirty="0"/>
-              <a:t>  `</a:t>
-            </a:r>
-            <a:r>
-              <a:rPr lang="en-US" dirty="0" err="1"/>
+              <a:rPr lang="en-US" sz="2600" dirty="0"/>
+              <a:t>  </a:t>
+            </a:r>
+            <a:r>
+              <a:rPr lang="en-US" sz="2600" dirty="0" err="1"/>
               <a:t>firstname</a:t>
             </a:r>
             <a:r>
-              <a:rPr lang="en-US" dirty="0"/>
-              <a:t>` VARCHAR(40),</a:t>
+              <a:rPr lang="en-US" sz="2600" dirty="0"/>
+              <a:t> VARCHAR(40),</a:t>
             </a:r>
           </a:p>
           <a:p>
@@ -9183,16 +9990,16 @@
               <a:buNone/>
             </a:pPr>
             <a:r>
-              <a:rPr lang="en-US" dirty="0"/>
-              <a:t>  `</a:t>
-            </a:r>
-            <a:r>
-              <a:rPr lang="en-US" dirty="0" err="1"/>
+              <a:rPr lang="en-US" sz="2600" dirty="0"/>
+              <a:t>  </a:t>
+            </a:r>
+            <a:r>
+              <a:rPr lang="en-US" sz="2600" dirty="0" err="1"/>
               <a:t>lastname</a:t>
             </a:r>
             <a:r>
-              <a:rPr lang="en-US" dirty="0"/>
-              <a:t>` VARCHAR(40),</a:t>
+              <a:rPr lang="en-US" sz="2600" dirty="0"/>
+              <a:t> VARCHAR(40),</a:t>
             </a:r>
           </a:p>
           <a:p>
@@ -9200,8 +10007,8 @@
               <a:buNone/>
             </a:pPr>
             <a:r>
-              <a:rPr lang="en-US" dirty="0"/>
-              <a:t>  `birthdate` DATE,</a:t>
+              <a:rPr lang="en-US" sz="2600" dirty="0"/>
+              <a:t>  birthdate DATE,</a:t>
             </a:r>
           </a:p>
           <a:p>
@@ -9209,8 +10016,20 @@
               <a:buNone/>
             </a:pPr>
             <a:r>
-              <a:rPr lang="en-US" dirty="0"/>
-              <a:t>  PRIMARY KEY (`id`)</a:t>
+              <a:rPr lang="en-US" sz="2600" dirty="0"/>
+              <a:t>  </a:t>
+            </a:r>
+            <a:r>
+              <a:rPr lang="en-US" sz="2600" dirty="0">
+                <a:solidFill>
+                  <a:schemeClr val="accent1"/>
+                </a:solidFill>
+              </a:rPr>
+              <a:t>PRIMARY KEY </a:t>
+            </a:r>
+            <a:r>
+              <a:rPr lang="en-US" sz="2600" dirty="0"/>
+              <a:t>(id)</a:t>
             </a:r>
           </a:p>
           <a:p>
@@ -9218,7 +10037,7 @@
               <a:buNone/>
             </a:pPr>
             <a:r>
-              <a:rPr lang="en-US" dirty="0"/>
+              <a:rPr lang="en-US" sz="2600" dirty="0"/>
               <a:t>);</a:t>
             </a:r>
           </a:p>
@@ -9226,33 +10045,35 @@
             <a:pPr marL="0" indent="0">
               <a:buNone/>
             </a:pPr>
-            <a:endParaRPr lang="en-US" dirty="0"/>
+            <a:endParaRPr lang="en-US" sz="2600" dirty="0"/>
           </a:p>
           <a:p>
             <a:pPr marL="0" indent="0">
               <a:buNone/>
             </a:pPr>
-            <a:r>
-              <a:rPr lang="en-US" dirty="0"/>
-              <a:t>CREATE TABLE `MANAGER` (</a:t>
-            </a:r>
+            <a:endParaRPr lang="en-US" sz="2600" dirty="0"/>
           </a:p>
           <a:p>
             <a:pPr marL="0" indent="0">
               <a:buNone/>
             </a:pPr>
-            <a:r>
-              <a:rPr lang="en-US" dirty="0"/>
-              <a:t>  `id` INT,</a:t>
-            </a:r>
+            <a:endParaRPr lang="en-US" sz="2600" dirty="0"/>
           </a:p>
           <a:p>
             <a:pPr marL="0" indent="0">
               <a:buNone/>
             </a:pPr>
             <a:r>
-              <a:rPr lang="en-US" dirty="0"/>
-              <a:t>  `manager` INT,</a:t>
+              <a:rPr lang="en-US" sz="2600" dirty="0">
+                <a:solidFill>
+                  <a:schemeClr val="accent1"/>
+                </a:solidFill>
+              </a:rPr>
+              <a:t>CREATE TABLE </a:t>
+            </a:r>
+            <a:r>
+              <a:rPr lang="en-US" sz="2600" dirty="0"/>
+              <a:t>Manager (</a:t>
             </a:r>
           </a:p>
           <a:p>
@@ -9260,8 +10081,8 @@
               <a:buNone/>
             </a:pPr>
             <a:r>
-              <a:rPr lang="en-US" dirty="0"/>
-              <a:t>  KEY `FK` (`id`)</a:t>
+              <a:rPr lang="en-US" sz="2600" dirty="0"/>
+              <a:t>  id INT,</a:t>
             </a:r>
           </a:p>
           <a:p>
@@ -9269,7 +10090,91 @@
               <a:buNone/>
             </a:pPr>
             <a:r>
-              <a:rPr lang="en-US" dirty="0"/>
+              <a:rPr lang="en-US" sz="2600" dirty="0"/>
+              <a:t>  manager INT,</a:t>
+            </a:r>
+          </a:p>
+          <a:p>
+            <a:pPr marL="0" indent="0">
+              <a:buNone/>
+            </a:pPr>
+            <a:r>
+              <a:rPr lang="en-US" sz="2600" dirty="0"/>
+              <a:t>  </a:t>
+            </a:r>
+            <a:r>
+              <a:rPr lang="en-US" sz="2600" dirty="0">
+                <a:solidFill>
+                  <a:schemeClr val="accent1"/>
+                </a:solidFill>
+              </a:rPr>
+              <a:t>PRIMARY KEY </a:t>
+            </a:r>
+            <a:r>
+              <a:rPr lang="en-US" sz="2600" dirty="0"/>
+              <a:t>(id),</a:t>
+            </a:r>
+          </a:p>
+          <a:p>
+            <a:pPr marL="0" indent="0">
+              <a:buNone/>
+            </a:pPr>
+            <a:r>
+              <a:rPr lang="en-US" sz="2600" dirty="0"/>
+              <a:t>  </a:t>
+            </a:r>
+            <a:r>
+              <a:rPr lang="en-US" sz="2600" dirty="0">
+                <a:solidFill>
+                  <a:schemeClr val="accent1"/>
+                </a:solidFill>
+              </a:rPr>
+              <a:t>FOREIGN KEY </a:t>
+            </a:r>
+            <a:r>
+              <a:rPr lang="en-US" sz="2600" dirty="0"/>
+              <a:t>(id) 	</a:t>
+            </a:r>
+            <a:r>
+              <a:rPr lang="en-US" sz="2600" dirty="0">
+                <a:solidFill>
+                  <a:schemeClr val="accent1"/>
+                </a:solidFill>
+              </a:rPr>
+              <a:t>REFERENCES</a:t>
+            </a:r>
+            <a:r>
+              <a:rPr lang="en-US" sz="2600" dirty="0"/>
+              <a:t> Person(id)</a:t>
+            </a:r>
+          </a:p>
+          <a:p>
+            <a:pPr marL="0" indent="0">
+              <a:buNone/>
+            </a:pPr>
+            <a:r>
+              <a:rPr lang="en-US" sz="2600" dirty="0"/>
+              <a:t>  FOREIGN KEY (manager) 	</a:t>
+            </a:r>
+            <a:r>
+              <a:rPr lang="en-US" sz="2600" dirty="0">
+                <a:solidFill>
+                  <a:schemeClr val="accent1"/>
+                </a:solidFill>
+              </a:rPr>
+              <a:t>REFERENCES</a:t>
+            </a:r>
+            <a:r>
+              <a:rPr lang="en-US" sz="2600" dirty="0"/>
+              <a:t> Person(id)</a:t>
+            </a:r>
+          </a:p>
+          <a:p>
+            <a:pPr marL="0" indent="0">
+              <a:buNone/>
+            </a:pPr>
+            <a:r>
+              <a:rPr lang="en-US" sz="2600" dirty="0"/>
               <a:t>);</a:t>
             </a:r>
           </a:p>

</xml_diff>